<commit_message>
Added my project final doc
</commit_message>
<xml_diff>
--- a/documents/project doc/Mid defence(Bike Sewa).pptx
+++ b/documents/project doc/Mid defence(Bike Sewa).pptx
@@ -5,10 +5,10 @@
     <p:sldMasterId id="2147483648" r:id="rId1"/>
   </p:sldMasterIdLst>
   <p:notesMasterIdLst>
-    <p:notesMasterId r:id="rId14"/>
+    <p:notesMasterId r:id="rId15"/>
   </p:notesMasterIdLst>
   <p:handoutMasterIdLst>
-    <p:handoutMasterId r:id="rId15"/>
+    <p:handoutMasterId r:id="rId16"/>
   </p:handoutMasterIdLst>
   <p:sldIdLst>
     <p:sldId id="256" r:id="rId2"/>
@@ -16,13 +16,14 @@
     <p:sldId id="272" r:id="rId4"/>
     <p:sldId id="269" r:id="rId5"/>
     <p:sldId id="275" r:id="rId6"/>
-    <p:sldId id="278" r:id="rId7"/>
-    <p:sldId id="271" r:id="rId8"/>
-    <p:sldId id="274" r:id="rId9"/>
-    <p:sldId id="280" r:id="rId10"/>
-    <p:sldId id="279" r:id="rId11"/>
-    <p:sldId id="262" r:id="rId12"/>
-    <p:sldId id="263" r:id="rId13"/>
+    <p:sldId id="271" r:id="rId7"/>
+    <p:sldId id="278" r:id="rId8"/>
+    <p:sldId id="281" r:id="rId9"/>
+    <p:sldId id="274" r:id="rId10"/>
+    <p:sldId id="280" r:id="rId11"/>
+    <p:sldId id="279" r:id="rId12"/>
+    <p:sldId id="262" r:id="rId13"/>
+    <p:sldId id="263" r:id="rId14"/>
   </p:sldIdLst>
   <p:sldSz cx="12192000" cy="6858000"/>
   <p:notesSz cx="6858000" cy="9144000"/>
@@ -226,7 +227,7 @@
           <a:p>
             <a:fld id="{A3D5648D-AB4A-40FD-BB9E-3666794D6F3A}" type="datetimeFigureOut">
               <a:rPr lang="en-US" smtClean="0"/>
-              <a:t>3/20/2022</a:t>
+              <a:t>6/17/2022</a:t>
             </a:fld>
             <a:endParaRPr lang="en-US"/>
           </a:p>
@@ -404,7 +405,7 @@
           <a:p>
             <a:fld id="{E9465079-9AF2-4487-B930-B2BF28D8F0FF}" type="datetimeFigureOut">
               <a:rPr lang="en-US" smtClean="0"/>
-              <a:t>3/20/2022</a:t>
+              <a:t>6/17/2022</a:t>
             </a:fld>
             <a:endParaRPr lang="en-US"/>
           </a:p>
@@ -817,9 +818,9 @@
           <a:bodyPr/>
           <a:lstStyle/>
           <a:p>
-            <a:fld id="{0144A364-1043-4040-A2EF-A574ADF303D4}" type="datetime1">
+            <a:fld id="{036E4184-707C-42DB-86A3-971F553E4213}" type="datetime1">
               <a:rPr lang="en-US" smtClean="0"/>
-              <a:t>3/20/2022</a:t>
+              <a:t>6/17/2022</a:t>
             </a:fld>
             <a:endParaRPr lang="en-US"/>
           </a:p>
@@ -1015,9 +1016,9 @@
           <a:bodyPr/>
           <a:lstStyle/>
           <a:p>
-            <a:fld id="{FE1E2CA2-7B05-4D81-8A8B-0FEDC0B911FF}" type="datetime1">
+            <a:fld id="{A2BB9B32-F42B-4D5C-AED9-CEBE03F4AD5C}" type="datetime1">
               <a:rPr lang="en-US" smtClean="0"/>
-              <a:t>3/20/2022</a:t>
+              <a:t>6/17/2022</a:t>
             </a:fld>
             <a:endParaRPr lang="en-US"/>
           </a:p>
@@ -1223,9 +1224,9 @@
           <a:bodyPr/>
           <a:lstStyle/>
           <a:p>
-            <a:fld id="{4E95FE16-9103-4D30-95C6-E0816E476B0C}" type="datetime1">
+            <a:fld id="{1642ECE4-865C-489F-A565-BAB7586E222D}" type="datetime1">
               <a:rPr lang="en-US" smtClean="0"/>
-              <a:t>3/20/2022</a:t>
+              <a:t>6/17/2022</a:t>
             </a:fld>
             <a:endParaRPr lang="en-US"/>
           </a:p>
@@ -1421,9 +1422,9 @@
           <a:bodyPr/>
           <a:lstStyle/>
           <a:p>
-            <a:fld id="{AB2C9CAF-C07B-40E6-BACD-EF5EF94033C8}" type="datetime1">
+            <a:fld id="{848F703A-7C86-4C06-96BD-F22056119836}" type="datetime1">
               <a:rPr lang="en-US" smtClean="0"/>
-              <a:t>3/20/2022</a:t>
+              <a:t>6/17/2022</a:t>
             </a:fld>
             <a:endParaRPr lang="en-US"/>
           </a:p>
@@ -1696,9 +1697,9 @@
           <a:bodyPr/>
           <a:lstStyle/>
           <a:p>
-            <a:fld id="{E2EE6164-7137-4AE1-9198-F0C5D4284DDC}" type="datetime1">
+            <a:fld id="{15D729B3-A26C-4596-B059-5FC517F92087}" type="datetime1">
               <a:rPr lang="en-US" smtClean="0"/>
-              <a:t>3/20/2022</a:t>
+              <a:t>6/17/2022</a:t>
             </a:fld>
             <a:endParaRPr lang="en-US"/>
           </a:p>
@@ -1961,9 +1962,9 @@
           <a:bodyPr/>
           <a:lstStyle/>
           <a:p>
-            <a:fld id="{E0279764-E8A3-478F-B2C6-753DE1B47611}" type="datetime1">
+            <a:fld id="{6AE9EC91-235A-4ED5-B081-484DDA5927A1}" type="datetime1">
               <a:rPr lang="en-US" smtClean="0"/>
-              <a:t>3/20/2022</a:t>
+              <a:t>6/17/2022</a:t>
             </a:fld>
             <a:endParaRPr lang="en-US"/>
           </a:p>
@@ -2373,9 +2374,9 @@
           <a:bodyPr/>
           <a:lstStyle/>
           <a:p>
-            <a:fld id="{C90883E3-8E9B-42D2-ADD4-4823AA32F952}" type="datetime1">
+            <a:fld id="{87DE85D3-8DCE-476E-B466-362E237500BD}" type="datetime1">
               <a:rPr lang="en-US" smtClean="0"/>
-              <a:t>3/20/2022</a:t>
+              <a:t>6/17/2022</a:t>
             </a:fld>
             <a:endParaRPr lang="en-US"/>
           </a:p>
@@ -2514,9 +2515,9 @@
           <a:bodyPr/>
           <a:lstStyle/>
           <a:p>
-            <a:fld id="{486E31E8-B684-4FEE-B268-77C5D64FCD20}" type="datetime1">
+            <a:fld id="{2DD8A40C-98DC-44BD-8F93-53C1777A5ECF}" type="datetime1">
               <a:rPr lang="en-US" smtClean="0"/>
-              <a:t>3/20/2022</a:t>
+              <a:t>6/17/2022</a:t>
             </a:fld>
             <a:endParaRPr lang="en-US"/>
           </a:p>
@@ -2627,9 +2628,9 @@
           <a:bodyPr/>
           <a:lstStyle/>
           <a:p>
-            <a:fld id="{2F425268-28D6-4A16-8ED8-89AF979B5F34}" type="datetime1">
+            <a:fld id="{AB545A69-2977-4FB7-817A-9951C0C20B59}" type="datetime1">
               <a:rPr lang="en-US" smtClean="0"/>
-              <a:t>3/20/2022</a:t>
+              <a:t>6/17/2022</a:t>
             </a:fld>
             <a:endParaRPr lang="en-US"/>
           </a:p>
@@ -2938,9 +2939,9 @@
           <a:bodyPr/>
           <a:lstStyle/>
           <a:p>
-            <a:fld id="{56F65B31-32BB-4889-B071-C1B4AD458EC8}" type="datetime1">
+            <a:fld id="{36576B37-EE6E-49A0-8E63-B1EC0EC94CA8}" type="datetime1">
               <a:rPr lang="en-US" smtClean="0"/>
-              <a:t>3/20/2022</a:t>
+              <a:t>6/17/2022</a:t>
             </a:fld>
             <a:endParaRPr lang="en-US"/>
           </a:p>
@@ -3226,9 +3227,9 @@
           <a:bodyPr/>
           <a:lstStyle/>
           <a:p>
-            <a:fld id="{7B63A861-E732-4501-9E31-3E119D57AF73}" type="datetime1">
+            <a:fld id="{367160F2-4801-466E-A982-A0172EDEC390}" type="datetime1">
               <a:rPr lang="en-US" smtClean="0"/>
-              <a:t>3/20/2022</a:t>
+              <a:t>6/17/2022</a:t>
             </a:fld>
             <a:endParaRPr lang="en-US"/>
           </a:p>
@@ -3467,9 +3468,9 @@
             </a:lvl1pPr>
           </a:lstStyle>
           <a:p>
-            <a:fld id="{66E4BBCA-3FF2-4ACA-9A0F-E9DECB9866C4}" type="datetime1">
+            <a:fld id="{56716E1D-6664-465F-9AB3-B75D4916368F}" type="datetime1">
               <a:rPr lang="en-US" smtClean="0"/>
-              <a:t>3/20/2022</a:t>
+              <a:t>6/17/2022</a:t>
             </a:fld>
             <a:endParaRPr lang="en-US"/>
           </a:p>
@@ -3905,8 +3906,8 @@
         </p:nvSpPr>
         <p:spPr>
           <a:xfrm>
-            <a:off x="1524000" y="721216"/>
-            <a:ext cx="9144000" cy="2880821"/>
+            <a:off x="1524000" y="721217"/>
+            <a:ext cx="9144000" cy="2459866"/>
           </a:xfrm>
         </p:spPr>
         <p:txBody>
@@ -3920,14 +3921,7 @@
                 <a:latin typeface="Times New Roman" panose="02020603050405020304" pitchFamily="18" charset="0"/>
                 <a:cs typeface="Times New Roman" panose="02020603050405020304" pitchFamily="18" charset="0"/>
               </a:rPr>
-              <a:t>Bike </a:t>
-            </a:r>
-            <a:r>
-              <a:rPr lang="en-US" sz="7200" dirty="0" err="1">
-                <a:latin typeface="Times New Roman" panose="02020603050405020304" pitchFamily="18" charset="0"/>
-                <a:cs typeface="Times New Roman" panose="02020603050405020304" pitchFamily="18" charset="0"/>
-              </a:rPr>
-              <a:t>Sewa</a:t>
+              <a:t>Bike Sewa</a:t>
             </a:r>
             <a:br>
               <a:rPr lang="en-US" sz="7200" dirty="0">
@@ -3944,19 +3938,6 @@
             </a:r>
             <a:br>
               <a:rPr lang="en-US" sz="7200" dirty="0">
-                <a:latin typeface="Times New Roman" panose="02020603050405020304" pitchFamily="18" charset="0"/>
-                <a:cs typeface="Times New Roman" panose="02020603050405020304" pitchFamily="18" charset="0"/>
-              </a:rPr>
-            </a:br>
-            <a:r>
-              <a:rPr lang="pt-BR" sz="2800" dirty="0">
-                <a:latin typeface="Times New Roman" panose="02020603050405020304" pitchFamily="18" charset="0"/>
-                <a:cs typeface="Times New Roman" panose="02020603050405020304" pitchFamily="18" charset="0"/>
-              </a:rPr>
-              <a:t>( B C A - 6th  S E M E S T E R )</a:t>
-            </a:r>
-            <a:br>
-              <a:rPr lang="pt-BR" sz="2800" dirty="0">
                 <a:latin typeface="Times New Roman" panose="02020603050405020304" pitchFamily="18" charset="0"/>
                 <a:cs typeface="Times New Roman" panose="02020603050405020304" pitchFamily="18" charset="0"/>
               </a:rPr>
@@ -3986,8 +3967,8 @@
         </p:nvSpPr>
         <p:spPr>
           <a:xfrm>
-            <a:off x="1845972" y="4481022"/>
-            <a:ext cx="9144000" cy="1655762"/>
+            <a:off x="1845972" y="2794715"/>
+            <a:ext cx="9144000" cy="3342069"/>
           </a:xfrm>
         </p:spPr>
         <p:txBody>
@@ -3996,51 +3977,39 @@
           </a:bodyPr>
           <a:lstStyle/>
           <a:p>
-            <a:pPr algn="r"/>
-            <a:r>
-              <a:rPr lang="en-US" sz="2800" b="1" dirty="0">
-                <a:latin typeface="Times New Roman" panose="02020603050405020304" pitchFamily="18" charset="0"/>
-                <a:cs typeface="Times New Roman" panose="02020603050405020304" pitchFamily="18" charset="0"/>
-              </a:rPr>
-              <a:t>Presented by:</a:t>
-            </a:r>
-            <a:endParaRPr lang="en-US" dirty="0">
-              <a:latin typeface="Times New Roman" panose="02020603050405020304" pitchFamily="18" charset="0"/>
-              <a:cs typeface="Times New Roman" panose="02020603050405020304" pitchFamily="18" charset="0"/>
-            </a:endParaRPr>
-          </a:p>
-          <a:p>
-            <a:pPr algn="r"/>
             <a:r>
               <a:rPr lang="en-US" dirty="0">
                 <a:latin typeface="Times New Roman" panose="02020603050405020304" pitchFamily="18" charset="0"/>
                 <a:cs typeface="Times New Roman" panose="02020603050405020304" pitchFamily="18" charset="0"/>
               </a:rPr>
-              <a:t>Ngima Sherpa (07)</a:t>
-            </a:r>
-          </a:p>
-          <a:p>
-            <a:pPr algn="r"/>
+              <a:t>Name: Ngima Sherpa (07)</a:t>
+            </a:r>
+          </a:p>
+          <a:p>
             <a:r>
               <a:rPr lang="en-US" dirty="0">
                 <a:latin typeface="Times New Roman" panose="02020603050405020304" pitchFamily="18" charset="0"/>
                 <a:cs typeface="Times New Roman" panose="02020603050405020304" pitchFamily="18" charset="0"/>
               </a:rPr>
-              <a:t>Date:19</a:t>
-            </a:r>
-            <a:r>
-              <a:rPr lang="en-US" baseline="30000" dirty="0">
-                <a:latin typeface="Times New Roman" panose="02020603050405020304" pitchFamily="18" charset="0"/>
-                <a:cs typeface="Times New Roman" panose="02020603050405020304" pitchFamily="18" charset="0"/>
-              </a:rPr>
-              <a:t>th</a:t>
-            </a:r>
+              <a:t>Course/Semester: BCA sixth semester</a:t>
+            </a:r>
+          </a:p>
+          <a:p>
             <a:r>
               <a:rPr lang="en-US" dirty="0">
                 <a:latin typeface="Times New Roman" panose="02020603050405020304" pitchFamily="18" charset="0"/>
                 <a:cs typeface="Times New Roman" panose="02020603050405020304" pitchFamily="18" charset="0"/>
               </a:rPr>
-              <a:t> March 2022</a:t>
+              <a:t> Supervisor: Mr. Yub Raj Kalathoki </a:t>
+            </a:r>
+          </a:p>
+          <a:p>
+            <a:r>
+              <a:rPr lang="en-US" dirty="0">
+                <a:latin typeface="Times New Roman" panose="02020603050405020304" pitchFamily="18" charset="0"/>
+                <a:cs typeface="Times New Roman" panose="02020603050405020304" pitchFamily="18" charset="0"/>
+              </a:rPr>
+              <a:t>Date: 2079/02/10</a:t>
             </a:r>
           </a:p>
         </p:txBody>
@@ -4114,7 +4083,7 @@
           <p:cNvPr id="2" name="Title 1">
             <a:extLst>
               <a:ext uri="{FF2B5EF4-FFF2-40B4-BE49-F238E27FC236}">
-                <a16:creationId xmlns:a16="http://schemas.microsoft.com/office/drawing/2014/main" id="{A5AD5A4A-7B8F-4F4D-A9A7-79A16EC7CA38}"/>
+                <a16:creationId xmlns:a16="http://schemas.microsoft.com/office/drawing/2014/main" id="{CD9CBB1A-EC20-4450-8184-2B6847A6B43F}"/>
               </a:ext>
             </a:extLst>
           </p:cNvPr>
@@ -4137,9 +4106,8 @@
                 <a:latin typeface="Times New Roman" panose="02020603050405020304" pitchFamily="18" charset="0"/>
                 <a:cs typeface="Times New Roman" panose="02020603050405020304" pitchFamily="18" charset="0"/>
               </a:rPr>
-              <a:t>Conclusion</a:t>
-            </a:r>
-            <a:endParaRPr lang="en-US" sz="4800" dirty="0"/>
+              <a:t>Demo</a:t>
+            </a:r>
           </a:p>
         </p:txBody>
       </p:sp>
@@ -4148,7 +4116,7 @@
           <p:cNvPr id="3" name="Content Placeholder 2">
             <a:extLst>
               <a:ext uri="{FF2B5EF4-FFF2-40B4-BE49-F238E27FC236}">
-                <a16:creationId xmlns:a16="http://schemas.microsoft.com/office/drawing/2014/main" id="{393CC177-4395-4FC5-8E05-4F9C79D83085}"/>
+                <a16:creationId xmlns:a16="http://schemas.microsoft.com/office/drawing/2014/main" id="{CF4B280A-E4A9-465B-A519-2741D38882B4}"/>
               </a:ext>
             </a:extLst>
           </p:cNvPr>
@@ -4159,34 +4127,21 @@
             <p:ph idx="1"/>
           </p:nvPr>
         </p:nvSpPr>
-        <p:spPr>
-          <a:xfrm>
-            <a:off x="838200" y="1838503"/>
-            <a:ext cx="10515600" cy="4351338"/>
-          </a:xfrm>
-        </p:spPr>
+        <p:spPr/>
         <p:txBody>
           <a:bodyPr/>
           <a:lstStyle/>
           <a:p>
             <a:pPr marL="0" indent="0">
-              <a:lnSpc>
-                <a:spcPct val="150000"/>
-              </a:lnSpc>
               <a:buNone/>
             </a:pPr>
             <a:r>
-              <a:rPr lang="en-US" b="0" i="0" dirty="0">
-                <a:effectLst/>
-                <a:latin typeface="Times New Roman" panose="02020603050405020304" pitchFamily="18" charset="0"/>
-                <a:cs typeface="Times New Roman" panose="02020603050405020304" pitchFamily="18" charset="0"/>
+              <a:rPr lang="en-US" dirty="0">
+                <a:hlinkClick r:id="rId2"/>
               </a:rPr>
-              <a:t>Everyone needs to get their Bike repaired or servicing. Making this process more convenient by providing online booking increases customer satisfaction and workshop efficiency</a:t>
-            </a:r>
-            <a:endParaRPr lang="en-US" dirty="0">
-              <a:latin typeface="Times New Roman" panose="02020603050405020304" pitchFamily="18" charset="0"/>
-              <a:cs typeface="Times New Roman" panose="02020603050405020304" pitchFamily="18" charset="0"/>
-            </a:endParaRPr>
+              <a:t>http://localhost:9494/BikeSewa/</a:t>
+            </a:r>
+            <a:endParaRPr lang="en-US" dirty="0"/>
           </a:p>
         </p:txBody>
       </p:sp>
@@ -4195,7 +4150,7 @@
           <p:cNvPr id="4" name="Slide Number Placeholder 3">
             <a:extLst>
               <a:ext uri="{FF2B5EF4-FFF2-40B4-BE49-F238E27FC236}">
-                <a16:creationId xmlns:a16="http://schemas.microsoft.com/office/drawing/2014/main" id="{27252336-87A4-48A5-9A99-F9424B796D8C}"/>
+                <a16:creationId xmlns:a16="http://schemas.microsoft.com/office/drawing/2014/main" id="{1DDA20B8-7283-44A6-85B5-5541DA769BD7}"/>
               </a:ext>
             </a:extLst>
           </p:cNvPr>
@@ -4212,17 +4167,17 @@
           <a:lstStyle/>
           <a:p>
             <a:fld id="{7A7E991E-64BF-47E2-9E90-5B64348DCA50}" type="slidenum">
-              <a:rPr lang="en-US" sz="2800" smtClean="0"/>
+              <a:rPr lang="en-US" smtClean="0"/>
               <a:t>10</a:t>
             </a:fld>
-            <a:endParaRPr lang="en-US" sz="2800" dirty="0"/>
+            <a:endParaRPr lang="en-US"/>
           </a:p>
         </p:txBody>
       </p:sp>
     </p:spTree>
     <p:extLst>
       <p:ext uri="{BB962C8B-B14F-4D97-AF65-F5344CB8AC3E}">
-        <p14:creationId xmlns:p14="http://schemas.microsoft.com/office/powerpoint/2010/main" val="3900661064"/>
+        <p14:creationId xmlns:p14="http://schemas.microsoft.com/office/powerpoint/2010/main" val="4212044755"/>
       </p:ext>
     </p:extLst>
   </p:cSld>
@@ -4254,7 +4209,7 @@
           <p:cNvPr id="2" name="Title 1">
             <a:extLst>
               <a:ext uri="{FF2B5EF4-FFF2-40B4-BE49-F238E27FC236}">
-                <a16:creationId xmlns:a16="http://schemas.microsoft.com/office/drawing/2014/main" id="{E5E42FF1-B303-4738-A7C0-BC632C8E8ED5}"/>
+                <a16:creationId xmlns:a16="http://schemas.microsoft.com/office/drawing/2014/main" id="{A5AD5A4A-7B8F-4F4D-A9A7-79A16EC7CA38}"/>
               </a:ext>
             </a:extLst>
           </p:cNvPr>
@@ -4265,68 +4220,104 @@
             <p:ph type="title"/>
           </p:nvPr>
         </p:nvSpPr>
-        <p:spPr>
-          <a:xfrm>
-            <a:off x="838199" y="1897062"/>
-            <a:ext cx="10515600" cy="3063875"/>
-          </a:xfrm>
-        </p:spPr>
+        <p:spPr/>
         <p:txBody>
           <a:bodyPr>
             <a:normAutofit/>
           </a:bodyPr>
           <a:lstStyle/>
           <a:p>
-            <a:pPr algn="ctr"/>
             <a:r>
               <a:rPr lang="en-US" sz="4800" b="1" dirty="0">
                 <a:latin typeface="Times New Roman" panose="02020603050405020304" pitchFamily="18" charset="0"/>
                 <a:cs typeface="Times New Roman" panose="02020603050405020304" pitchFamily="18" charset="0"/>
               </a:rPr>
-              <a:t>Any Questions ?</a:t>
-            </a:r>
-          </a:p>
-        </p:txBody>
-      </p:sp>
-      <p:sp>
-        <p:nvSpPr>
-          <p:cNvPr id="4" name="Slide Number Placeholder 3">
-            <a:extLst>
-              <a:ext uri="{FF2B5EF4-FFF2-40B4-BE49-F238E27FC236}">
-                <a16:creationId xmlns:a16="http://schemas.microsoft.com/office/drawing/2014/main" id="{C039CC50-51C0-45CE-A5CF-C671E5E02753}"/>
-              </a:ext>
-            </a:extLst>
-          </p:cNvPr>
-          <p:cNvSpPr>
-            <a:spLocks noGrp="1"/>
-          </p:cNvSpPr>
-          <p:nvPr>
-            <p:ph type="sldNum" sz="quarter" idx="12"/>
-          </p:nvPr>
-        </p:nvSpPr>
-        <p:spPr/>
+              <a:t>Conclusion</a:t>
+            </a:r>
+            <a:endParaRPr lang="en-US" sz="4800" dirty="0"/>
+          </a:p>
+        </p:txBody>
+      </p:sp>
+      <p:sp>
+        <p:nvSpPr>
+          <p:cNvPr id="3" name="Content Placeholder 2">
+            <a:extLst>
+              <a:ext uri="{FF2B5EF4-FFF2-40B4-BE49-F238E27FC236}">
+                <a16:creationId xmlns:a16="http://schemas.microsoft.com/office/drawing/2014/main" id="{393CC177-4395-4FC5-8E05-4F9C79D83085}"/>
+              </a:ext>
+            </a:extLst>
+          </p:cNvPr>
+          <p:cNvSpPr>
+            <a:spLocks noGrp="1"/>
+          </p:cNvSpPr>
+          <p:nvPr>
+            <p:ph idx="1"/>
+          </p:nvPr>
+        </p:nvSpPr>
+        <p:spPr>
+          <a:xfrm>
+            <a:off x="838200" y="1838503"/>
+            <a:ext cx="10515600" cy="4351338"/>
+          </a:xfrm>
+        </p:spPr>
         <p:txBody>
           <a:bodyPr/>
           <a:lstStyle/>
           <a:p>
-            <a:fld id="{7A7E991E-64BF-47E2-9E90-5B64348DCA50}" type="slidenum">
-              <a:rPr lang="en-US" sz="2800" b="1" smtClean="0">
+            <a:pPr marL="0" indent="0">
+              <a:lnSpc>
+                <a:spcPct val="150000"/>
+              </a:lnSpc>
+              <a:buNone/>
+            </a:pPr>
+            <a:r>
+              <a:rPr lang="en-US" b="0" i="0" dirty="0">
+                <a:effectLst/>
                 <a:latin typeface="Times New Roman" panose="02020603050405020304" pitchFamily="18" charset="0"/>
                 <a:cs typeface="Times New Roman" panose="02020603050405020304" pitchFamily="18" charset="0"/>
               </a:rPr>
-              <a:t>11</a:t>
-            </a:fld>
-            <a:endParaRPr lang="en-US" sz="2800" b="1" dirty="0">
+              <a:t>Everyone needs to get their Bike repaired or servicing. Making this process more convenient by providing online booking increases customer satisfaction and workshop efficiency</a:t>
+            </a:r>
+            <a:endParaRPr lang="en-US" dirty="0">
               <a:latin typeface="Times New Roman" panose="02020603050405020304" pitchFamily="18" charset="0"/>
               <a:cs typeface="Times New Roman" panose="02020603050405020304" pitchFamily="18" charset="0"/>
             </a:endParaRPr>
           </a:p>
         </p:txBody>
       </p:sp>
+      <p:sp>
+        <p:nvSpPr>
+          <p:cNvPr id="4" name="Slide Number Placeholder 3">
+            <a:extLst>
+              <a:ext uri="{FF2B5EF4-FFF2-40B4-BE49-F238E27FC236}">
+                <a16:creationId xmlns:a16="http://schemas.microsoft.com/office/drawing/2014/main" id="{27252336-87A4-48A5-9A99-F9424B796D8C}"/>
+              </a:ext>
+            </a:extLst>
+          </p:cNvPr>
+          <p:cNvSpPr>
+            <a:spLocks noGrp="1"/>
+          </p:cNvSpPr>
+          <p:nvPr>
+            <p:ph type="sldNum" sz="quarter" idx="12"/>
+          </p:nvPr>
+        </p:nvSpPr>
+        <p:spPr/>
+        <p:txBody>
+          <a:bodyPr/>
+          <a:lstStyle/>
+          <a:p>
+            <a:fld id="{7A7E991E-64BF-47E2-9E90-5B64348DCA50}" type="slidenum">
+              <a:rPr lang="en-US" sz="2800" smtClean="0"/>
+              <a:t>11</a:t>
+            </a:fld>
+            <a:endParaRPr lang="en-US" sz="2800" dirty="0"/>
+          </a:p>
+        </p:txBody>
+      </p:sp>
     </p:spTree>
     <p:extLst>
       <p:ext uri="{BB962C8B-B14F-4D97-AF65-F5344CB8AC3E}">
-        <p14:creationId xmlns:p14="http://schemas.microsoft.com/office/powerpoint/2010/main" val="3175926295"/>
+        <p14:creationId xmlns:p14="http://schemas.microsoft.com/office/powerpoint/2010/main" val="3900661064"/>
       </p:ext>
     </p:extLst>
   </p:cSld>
@@ -4371,6 +4362,110 @@
         </p:nvSpPr>
         <p:spPr>
           <a:xfrm>
+            <a:off x="838199" y="1897062"/>
+            <a:ext cx="10515600" cy="3063875"/>
+          </a:xfrm>
+        </p:spPr>
+        <p:txBody>
+          <a:bodyPr>
+            <a:normAutofit/>
+          </a:bodyPr>
+          <a:lstStyle/>
+          <a:p>
+            <a:pPr algn="ctr"/>
+            <a:r>
+              <a:rPr lang="en-US" sz="4800" b="1" dirty="0">
+                <a:latin typeface="Times New Roman" panose="02020603050405020304" pitchFamily="18" charset="0"/>
+                <a:cs typeface="Times New Roman" panose="02020603050405020304" pitchFamily="18" charset="0"/>
+              </a:rPr>
+              <a:t>Any Questions ?</a:t>
+            </a:r>
+          </a:p>
+        </p:txBody>
+      </p:sp>
+      <p:sp>
+        <p:nvSpPr>
+          <p:cNvPr id="4" name="Slide Number Placeholder 3">
+            <a:extLst>
+              <a:ext uri="{FF2B5EF4-FFF2-40B4-BE49-F238E27FC236}">
+                <a16:creationId xmlns:a16="http://schemas.microsoft.com/office/drawing/2014/main" id="{C039CC50-51C0-45CE-A5CF-C671E5E02753}"/>
+              </a:ext>
+            </a:extLst>
+          </p:cNvPr>
+          <p:cNvSpPr>
+            <a:spLocks noGrp="1"/>
+          </p:cNvSpPr>
+          <p:nvPr>
+            <p:ph type="sldNum" sz="quarter" idx="12"/>
+          </p:nvPr>
+        </p:nvSpPr>
+        <p:spPr/>
+        <p:txBody>
+          <a:bodyPr/>
+          <a:lstStyle/>
+          <a:p>
+            <a:fld id="{7A7E991E-64BF-47E2-9E90-5B64348DCA50}" type="slidenum">
+              <a:rPr lang="en-US" sz="2800" b="1" smtClean="0">
+                <a:latin typeface="Times New Roman" panose="02020603050405020304" pitchFamily="18" charset="0"/>
+                <a:cs typeface="Times New Roman" panose="02020603050405020304" pitchFamily="18" charset="0"/>
+              </a:rPr>
+              <a:t>12</a:t>
+            </a:fld>
+            <a:endParaRPr lang="en-US" sz="2800" b="1" dirty="0">
+              <a:latin typeface="Times New Roman" panose="02020603050405020304" pitchFamily="18" charset="0"/>
+              <a:cs typeface="Times New Roman" panose="02020603050405020304" pitchFamily="18" charset="0"/>
+            </a:endParaRPr>
+          </a:p>
+        </p:txBody>
+      </p:sp>
+    </p:spTree>
+    <p:extLst>
+      <p:ext uri="{BB962C8B-B14F-4D97-AF65-F5344CB8AC3E}">
+        <p14:creationId xmlns:p14="http://schemas.microsoft.com/office/powerpoint/2010/main" val="3175926295"/>
+      </p:ext>
+    </p:extLst>
+  </p:cSld>
+  <p:clrMapOvr>
+    <a:masterClrMapping/>
+  </p:clrMapOvr>
+</p:sld>
+</file>
+
+<file path=ppt/slides/slide13.xml><?xml version="1.0" encoding="utf-8"?>
+<p:sld xmlns:a="http://schemas.openxmlformats.org/drawingml/2006/main" xmlns:r="http://schemas.openxmlformats.org/officeDocument/2006/relationships" xmlns:p="http://schemas.openxmlformats.org/presentationml/2006/main">
+  <p:cSld>
+    <p:spTree>
+      <p:nvGrpSpPr>
+        <p:cNvPr id="1" name=""/>
+        <p:cNvGrpSpPr/>
+        <p:nvPr/>
+      </p:nvGrpSpPr>
+      <p:grpSpPr>
+        <a:xfrm>
+          <a:off x="0" y="0"/>
+          <a:ext cx="0" cy="0"/>
+          <a:chOff x="0" y="0"/>
+          <a:chExt cx="0" cy="0"/>
+        </a:xfrm>
+      </p:grpSpPr>
+      <p:sp>
+        <p:nvSpPr>
+          <p:cNvPr id="2" name="Title 1">
+            <a:extLst>
+              <a:ext uri="{FF2B5EF4-FFF2-40B4-BE49-F238E27FC236}">
+                <a16:creationId xmlns:a16="http://schemas.microsoft.com/office/drawing/2014/main" id="{E5E42FF1-B303-4738-A7C0-BC632C8E8ED5}"/>
+              </a:ext>
+            </a:extLst>
+          </p:cNvPr>
+          <p:cNvSpPr>
+            <a:spLocks noGrp="1"/>
+          </p:cNvSpPr>
+          <p:nvPr>
+            <p:ph type="title"/>
+          </p:nvPr>
+        </p:nvSpPr>
+        <p:spPr>
+          <a:xfrm>
             <a:off x="2374900" y="1528762"/>
             <a:ext cx="6134099" cy="3063875"/>
           </a:xfrm>
@@ -4414,7 +4509,7 @@
           <a:p>
             <a:fld id="{7A7E991E-64BF-47E2-9E90-5B64348DCA50}" type="slidenum">
               <a:rPr lang="en-US" sz="2800" b="1" smtClean="0"/>
-              <a:t>12</a:t>
+              <a:t>13</a:t>
             </a:fld>
             <a:endParaRPr lang="en-US" sz="2800" b="1" dirty="0"/>
           </a:p>
@@ -4624,7 +4719,7 @@
                 <a:latin typeface="Times New Roman" panose="02020603050405020304" pitchFamily="18" charset="0"/>
                 <a:cs typeface="Times New Roman" panose="02020603050405020304" pitchFamily="18" charset="0"/>
               </a:rPr>
-              <a:t>ser can login , update profile ,online booking, view old servicing record through online</a:t>
+              <a:t>ser can login , update profile ,add/update bike, online booking, view old servicing record through online</a:t>
             </a:r>
           </a:p>
           <a:p>
@@ -4640,7 +4735,7 @@
                 <a:latin typeface="Times New Roman" panose="02020603050405020304" pitchFamily="18" charset="0"/>
                 <a:cs typeface="Times New Roman" panose="02020603050405020304" pitchFamily="18" charset="0"/>
               </a:rPr>
-              <a:t>Admin can do CRUD operation on customer/bike/mechanic, Revenue calculation, Manage schedule</a:t>
+              <a:t>Admin can do CRUD operation on customer/bike/mechanic, and can view total customers, bikes, accepted booking, mechanic.</a:t>
             </a:r>
           </a:p>
         </p:txBody>
@@ -4815,6 +4910,22 @@
             </a:r>
           </a:p>
           <a:p>
+            <a:pPr marL="342900" indent="-342900" algn="l">
+              <a:lnSpc>
+                <a:spcPct val="150000"/>
+              </a:lnSpc>
+              <a:buFont typeface="Wingdings" panose="05000000000000000000" pitchFamily="2" charset="2"/>
+              <a:buChar char="Ø"/>
+            </a:pPr>
+            <a:r>
+              <a:rPr lang="en-US" sz="2800" dirty="0">
+                <a:latin typeface="Times New Roman" panose="02020603050405020304" pitchFamily="18" charset="0"/>
+                <a:cs typeface="Times New Roman" panose="02020603050405020304" pitchFamily="18" charset="0"/>
+              </a:rPr>
+              <a:t> Customers have to wait in the queue</a:t>
+            </a:r>
+          </a:p>
+          <a:p>
             <a:pPr algn="l">
               <a:lnSpc>
                 <a:spcPct val="150000"/>
@@ -4958,7 +5069,7 @@
         </p:spPr>
         <p:txBody>
           <a:bodyPr>
-            <a:normAutofit/>
+            <a:normAutofit lnSpcReduction="10000"/>
           </a:bodyPr>
           <a:lstStyle/>
           <a:p>
@@ -5038,76 +5149,8 @@
                 <a:ea typeface="+mn-ea"/>
                 <a:cs typeface="Times New Roman" panose="02020603050405020304" pitchFamily="18" charset="0"/>
               </a:rPr>
-              <a:t>To view </a:t>
-            </a:r>
-            <a:r>
-              <a:rPr lang="en-US" sz="2800" dirty="0" err="1">
-                <a:solidFill>
-                  <a:prstClr val="black"/>
-                </a:solidFill>
-                <a:latin typeface="Times New Roman" panose="02020603050405020304" pitchFamily="18" charset="0"/>
-                <a:cs typeface="Times New Roman" panose="02020603050405020304" pitchFamily="18" charset="0"/>
-              </a:rPr>
-              <a:t>ol</a:t>
-            </a:r>
-            <a:r>
-              <a:rPr kumimoji="0" lang="en-US" sz="2800" b="0" i="0" u="none" strike="noStrike" kern="1200" cap="none" spc="0" normalizeH="0" baseline="0" noProof="0" dirty="0">
-                <a:ln>
-                  <a:noFill/>
-                </a:ln>
-                <a:solidFill>
-                  <a:prstClr val="black"/>
-                </a:solidFill>
-                <a:effectLst/>
-                <a:uLnTx/>
-                <a:uFillTx/>
-                <a:latin typeface="Times New Roman" panose="02020603050405020304" pitchFamily="18" charset="0"/>
-                <a:ea typeface="+mn-ea"/>
-                <a:cs typeface="Times New Roman" panose="02020603050405020304" pitchFamily="18" charset="0"/>
-              </a:rPr>
-              <a:t>d servicing </a:t>
-            </a:r>
-            <a:r>
-              <a:rPr lang="en-US" sz="2800" dirty="0">
-                <a:solidFill>
-                  <a:prstClr val="black"/>
-                </a:solidFill>
-                <a:latin typeface="Times New Roman" panose="02020603050405020304" pitchFamily="18" charset="0"/>
-                <a:cs typeface="Times New Roman" panose="02020603050405020304" pitchFamily="18" charset="0"/>
-              </a:rPr>
-              <a:t>r</a:t>
-            </a:r>
-            <a:r>
-              <a:rPr kumimoji="0" lang="en-US" sz="2800" b="0" i="0" u="none" strike="noStrike" kern="1200" cap="none" spc="0" normalizeH="0" baseline="0" noProof="0" dirty="0" err="1">
-                <a:ln>
-                  <a:noFill/>
-                </a:ln>
-                <a:solidFill>
-                  <a:prstClr val="black"/>
-                </a:solidFill>
-                <a:effectLst/>
-                <a:uLnTx/>
-                <a:uFillTx/>
-                <a:latin typeface="Times New Roman" panose="02020603050405020304" pitchFamily="18" charset="0"/>
-                <a:ea typeface="+mn-ea"/>
-                <a:cs typeface="Times New Roman" panose="02020603050405020304" pitchFamily="18" charset="0"/>
-              </a:rPr>
-              <a:t>ecordes</a:t>
-            </a:r>
-            <a:endParaRPr kumimoji="0" lang="en-US" sz="2800" b="0" i="0" u="none" strike="noStrike" kern="1200" cap="none" spc="0" normalizeH="0" baseline="0" noProof="0" dirty="0">
-              <a:ln>
-                <a:noFill/>
-              </a:ln>
-              <a:solidFill>
-                <a:prstClr val="black"/>
-              </a:solidFill>
-              <a:effectLst/>
-              <a:uLnTx/>
-              <a:uFillTx/>
-              <a:latin typeface="Times New Roman" panose="02020603050405020304" pitchFamily="18" charset="0"/>
-              <a:ea typeface="+mn-ea"/>
-              <a:cs typeface="Times New Roman" panose="02020603050405020304" pitchFamily="18" charset="0"/>
-            </a:endParaRPr>
+              <a:t>To  view old servicing records</a:t>
+            </a:r>
           </a:p>
           <a:p>
             <a:pPr marL="228600" marR="0" lvl="0" indent="-228600" algn="l" defTabSz="914400" rtl="0" eaLnBrk="1" fontAlgn="auto" latinLnBrk="0" hangingPunct="1">
@@ -5142,7 +5185,7 @@
                 <a:ea typeface="+mn-ea"/>
                 <a:cs typeface="Times New Roman" panose="02020603050405020304" pitchFamily="18" charset="0"/>
               </a:rPr>
-              <a:t>To store repair and maintenance data of bikes</a:t>
+              <a:t>To get feedback from customers to analyze the company services from the customer point of view</a:t>
             </a:r>
           </a:p>
           <a:p>
@@ -5163,20 +5206,23 @@
               <a:tabLst/>
               <a:defRPr/>
             </a:pPr>
-            <a:endParaRPr kumimoji="0" lang="en-US" sz="2800" b="0" i="0" u="none" strike="noStrike" kern="1200" cap="none" spc="0" normalizeH="0" baseline="0" noProof="0" dirty="0">
-              <a:ln>
-                <a:noFill/>
-              </a:ln>
-              <a:solidFill>
-                <a:prstClr val="black"/>
-              </a:solidFill>
-              <a:effectLst/>
-              <a:uLnTx/>
-              <a:uFillTx/>
-              <a:latin typeface="Times New Roman" panose="02020603050405020304" pitchFamily="18" charset="0"/>
-              <a:ea typeface="+mn-ea"/>
-              <a:cs typeface="Times New Roman" panose="02020603050405020304" pitchFamily="18" charset="0"/>
-            </a:endParaRPr>
+            <a:r>
+              <a:rPr kumimoji="0" lang="en-US" sz="2800" b="0" i="0" u="none" strike="noStrike" kern="1200" cap="none" spc="0" normalizeH="0" baseline="0" noProof="0" dirty="0">
+                <a:ln>
+                  <a:noFill/>
+                </a:ln>
+                <a:solidFill>
+                  <a:prstClr val="black"/>
+                </a:solidFill>
+                <a:effectLst/>
+                <a:uLnTx/>
+                <a:uFillTx/>
+                <a:latin typeface="Times New Roman" panose="02020603050405020304" pitchFamily="18" charset="0"/>
+                <a:ea typeface="+mn-ea"/>
+                <a:cs typeface="Times New Roman" panose="02020603050405020304" pitchFamily="18" charset="0"/>
+              </a:rPr>
+              <a:t>To Provide better services to customer</a:t>
+            </a:r>
           </a:p>
           <a:p>
             <a:pPr algn="l">
@@ -5320,19 +5366,9 @@
               <a:buChar char=""/>
             </a:pPr>
             <a:r>
-              <a:rPr lang="en-US" dirty="0">
-                <a:effectLst/>
-                <a:latin typeface="Times New Roman" panose="02020603050405020304" pitchFamily="18" charset="0"/>
-                <a:ea typeface="Calibri" panose="020F0502020204030204" pitchFamily="34" charset="0"/>
-                <a:cs typeface="Times New Roman" panose="02020603050405020304" pitchFamily="18" charset="0"/>
-              </a:rPr>
-              <a:t>Customer have to book even without seeing actually how service center looks like</a:t>
-            </a:r>
-            <a:endParaRPr lang="en-US" dirty="0">
-              <a:latin typeface="Times New Roman" panose="02020603050405020304" pitchFamily="18" charset="0"/>
-              <a:ea typeface="Calibri" panose="020F0502020204030204" pitchFamily="34" charset="0"/>
-              <a:cs typeface="Times New Roman" panose="02020603050405020304" pitchFamily="18" charset="0"/>
-            </a:endParaRPr>
+              <a:rPr lang="en-US" dirty="0"/>
+              <a:t>Online payment is not present</a:t>
+            </a:r>
           </a:p>
           <a:p>
             <a:pPr marL="342900" marR="0" lvl="0" indent="-342900">
@@ -5349,13 +5385,8 @@
               <a:buChar char=""/>
             </a:pPr>
             <a:r>
-              <a:rPr lang="en-US" dirty="0">
-                <a:effectLst/>
-                <a:latin typeface="Times New Roman" panose="02020603050405020304" pitchFamily="18" charset="0"/>
-                <a:ea typeface="Calibri" panose="020F0502020204030204" pitchFamily="34" charset="0"/>
-                <a:cs typeface="Times New Roman" panose="02020603050405020304" pitchFamily="18" charset="0"/>
-              </a:rPr>
-              <a:t>Sometime it may contain technical problems</a:t>
+              <a:rPr lang="en-US" dirty="0"/>
+              <a:t>The customer has to book for service with a time slot</a:t>
             </a:r>
           </a:p>
         </p:txBody>
@@ -5403,6 +5434,746 @@
 </file>
 
 <file path=ppt/slides/slide6.xml><?xml version="1.0" encoding="utf-8"?>
+<p:sld xmlns:a="http://schemas.openxmlformats.org/drawingml/2006/main" xmlns:r="http://schemas.openxmlformats.org/officeDocument/2006/relationships" xmlns:p="http://schemas.openxmlformats.org/presentationml/2006/main">
+  <p:cSld>
+    <p:spTree>
+      <p:nvGrpSpPr>
+        <p:cNvPr id="1" name=""/>
+        <p:cNvGrpSpPr/>
+        <p:nvPr/>
+      </p:nvGrpSpPr>
+      <p:grpSpPr>
+        <a:xfrm>
+          <a:off x="0" y="0"/>
+          <a:ext cx="0" cy="0"/>
+          <a:chOff x="0" y="0"/>
+          <a:chExt cx="0" cy="0"/>
+        </a:xfrm>
+      </p:grpSpPr>
+      <p:sp>
+        <p:nvSpPr>
+          <p:cNvPr id="2" name="Title 1">
+            <a:extLst>
+              <a:ext uri="{FF2B5EF4-FFF2-40B4-BE49-F238E27FC236}">
+                <a16:creationId xmlns:a16="http://schemas.microsoft.com/office/drawing/2014/main" id="{140910CD-A693-4C4E-8E0A-4A830409B2A4}"/>
+              </a:ext>
+            </a:extLst>
+          </p:cNvPr>
+          <p:cNvSpPr>
+            <a:spLocks noGrp="1"/>
+          </p:cNvSpPr>
+          <p:nvPr>
+            <p:ph type="ctrTitle"/>
+          </p:nvPr>
+        </p:nvSpPr>
+        <p:spPr>
+          <a:xfrm>
+            <a:off x="515155" y="141667"/>
+            <a:ext cx="9972541" cy="965915"/>
+          </a:xfrm>
+        </p:spPr>
+        <p:txBody>
+          <a:bodyPr>
+            <a:normAutofit/>
+          </a:bodyPr>
+          <a:lstStyle/>
+          <a:p>
+            <a:pPr algn="l"/>
+            <a:r>
+              <a:rPr lang="en-US" sz="4800" b="1" dirty="0">
+                <a:latin typeface="Times New Roman" panose="02020603050405020304" pitchFamily="18" charset="0"/>
+                <a:cs typeface="Times New Roman" panose="02020603050405020304" pitchFamily="18" charset="0"/>
+              </a:rPr>
+              <a:t>Tools and Technology</a:t>
+            </a:r>
+            <a:endParaRPr lang="en-US" sz="4800" dirty="0"/>
+          </a:p>
+        </p:txBody>
+      </p:sp>
+      <p:sp>
+        <p:nvSpPr>
+          <p:cNvPr id="3" name="Subtitle 2">
+            <a:extLst>
+              <a:ext uri="{FF2B5EF4-FFF2-40B4-BE49-F238E27FC236}">
+                <a16:creationId xmlns:a16="http://schemas.microsoft.com/office/drawing/2014/main" id="{BE2009EE-B819-4E87-ADF5-8A6F668F97ED}"/>
+              </a:ext>
+            </a:extLst>
+          </p:cNvPr>
+          <p:cNvSpPr>
+            <a:spLocks noGrp="1"/>
+          </p:cNvSpPr>
+          <p:nvPr>
+            <p:ph type="subTitle" idx="1"/>
+          </p:nvPr>
+        </p:nvSpPr>
+        <p:spPr>
+          <a:xfrm>
+            <a:off x="1120462" y="1262130"/>
+            <a:ext cx="9547538" cy="5357611"/>
+          </a:xfrm>
+        </p:spPr>
+        <p:txBody>
+          <a:bodyPr>
+            <a:normAutofit fontScale="62500" lnSpcReduction="20000"/>
+          </a:bodyPr>
+          <a:lstStyle/>
+          <a:p>
+            <a:pPr marL="228600" marR="0" lvl="0" indent="-228600" algn="l" defTabSz="914400" rtl="0" eaLnBrk="1" fontAlgn="auto" latinLnBrk="0" hangingPunct="1">
+              <a:lnSpc>
+                <a:spcPct val="90000"/>
+              </a:lnSpc>
+              <a:spcBef>
+                <a:spcPts val="1000"/>
+              </a:spcBef>
+              <a:spcAft>
+                <a:spcPts val="0"/>
+              </a:spcAft>
+              <a:buClrTx/>
+              <a:buSzTx/>
+              <a:buFont typeface="Wingdings" panose="05000000000000000000" pitchFamily="2" charset="2"/>
+              <a:buChar char="Ø"/>
+              <a:tabLst/>
+              <a:defRPr/>
+            </a:pPr>
+            <a:r>
+              <a:rPr kumimoji="0" lang="en-US" sz="2800" b="0" i="0" u="none" strike="noStrike" kern="1200" cap="none" spc="0" normalizeH="0" baseline="0" noProof="0" dirty="0">
+                <a:ln>
+                  <a:noFill/>
+                </a:ln>
+                <a:solidFill>
+                  <a:prstClr val="black"/>
+                </a:solidFill>
+                <a:effectLst/>
+                <a:uLnTx/>
+                <a:uFillTx/>
+                <a:latin typeface="Times New Roman" panose="02020603050405020304" pitchFamily="18" charset="0"/>
+                <a:ea typeface="+mn-ea"/>
+                <a:cs typeface="Times New Roman" panose="02020603050405020304" pitchFamily="18" charset="0"/>
+              </a:rPr>
+              <a:t> </a:t>
+            </a:r>
+            <a:r>
+              <a:rPr kumimoji="0" lang="en-US" sz="3800" b="1" i="0" u="none" strike="noStrike" kern="1200" cap="none" spc="0" normalizeH="0" baseline="0" noProof="0" dirty="0">
+                <a:ln>
+                  <a:noFill/>
+                </a:ln>
+                <a:solidFill>
+                  <a:prstClr val="black"/>
+                </a:solidFill>
+                <a:effectLst/>
+                <a:uLnTx/>
+                <a:uFillTx/>
+                <a:latin typeface="Times New Roman" panose="02020603050405020304" pitchFamily="18" charset="0"/>
+                <a:ea typeface="+mn-ea"/>
+                <a:cs typeface="Times New Roman" panose="02020603050405020304" pitchFamily="18" charset="0"/>
+              </a:rPr>
+              <a:t>Frontend tools</a:t>
+            </a:r>
+          </a:p>
+          <a:p>
+            <a:pPr marL="685800" marR="0" lvl="1" indent="-228600" algn="l" defTabSz="914400" rtl="0" eaLnBrk="1" fontAlgn="auto" latinLnBrk="0" hangingPunct="1">
+              <a:lnSpc>
+                <a:spcPct val="90000"/>
+              </a:lnSpc>
+              <a:spcBef>
+                <a:spcPts val="500"/>
+              </a:spcBef>
+              <a:spcAft>
+                <a:spcPts val="0"/>
+              </a:spcAft>
+              <a:buClrTx/>
+              <a:buSzTx/>
+              <a:buFont typeface="Arial" panose="020B0604020202020204" pitchFamily="34" charset="0"/>
+              <a:buChar char="•"/>
+              <a:tabLst/>
+              <a:defRPr/>
+            </a:pPr>
+            <a:r>
+              <a:rPr kumimoji="0" lang="en-US" sz="3800" b="0" i="0" u="none" strike="noStrike" kern="1200" cap="none" spc="0" normalizeH="0" baseline="0" noProof="0" dirty="0">
+                <a:ln>
+                  <a:noFill/>
+                </a:ln>
+                <a:solidFill>
+                  <a:prstClr val="black"/>
+                </a:solidFill>
+                <a:effectLst/>
+                <a:uLnTx/>
+                <a:uFillTx/>
+                <a:latin typeface="Times New Roman" panose="02020603050405020304" pitchFamily="18" charset="0"/>
+                <a:ea typeface="+mn-ea"/>
+                <a:cs typeface="Times New Roman" panose="02020603050405020304" pitchFamily="18" charset="0"/>
+              </a:rPr>
+              <a:t>HTML5</a:t>
+            </a:r>
+          </a:p>
+          <a:p>
+            <a:pPr marL="685800" marR="0" lvl="1" indent="-228600" algn="l" defTabSz="914400" rtl="0" eaLnBrk="1" fontAlgn="auto" latinLnBrk="0" hangingPunct="1">
+              <a:lnSpc>
+                <a:spcPct val="90000"/>
+              </a:lnSpc>
+              <a:spcBef>
+                <a:spcPts val="500"/>
+              </a:spcBef>
+              <a:spcAft>
+                <a:spcPts val="0"/>
+              </a:spcAft>
+              <a:buClrTx/>
+              <a:buSzTx/>
+              <a:buFont typeface="Arial" panose="020B0604020202020204" pitchFamily="34" charset="0"/>
+              <a:buChar char="•"/>
+              <a:tabLst/>
+              <a:defRPr/>
+            </a:pPr>
+            <a:r>
+              <a:rPr kumimoji="0" lang="en-US" sz="3800" b="0" i="0" u="none" strike="noStrike" kern="1200" cap="none" spc="0" normalizeH="0" baseline="0" noProof="0" dirty="0">
+                <a:ln>
+                  <a:noFill/>
+                </a:ln>
+                <a:solidFill>
+                  <a:prstClr val="black"/>
+                </a:solidFill>
+                <a:effectLst/>
+                <a:uLnTx/>
+                <a:uFillTx/>
+                <a:latin typeface="Times New Roman" panose="02020603050405020304" pitchFamily="18" charset="0"/>
+                <a:ea typeface="+mn-ea"/>
+                <a:cs typeface="Times New Roman" panose="02020603050405020304" pitchFamily="18" charset="0"/>
+              </a:rPr>
+              <a:t>CSS3</a:t>
+            </a:r>
+          </a:p>
+          <a:p>
+            <a:pPr marL="685800" marR="0" lvl="1" indent="-228600" algn="l" defTabSz="914400" rtl="0" eaLnBrk="1" fontAlgn="auto" latinLnBrk="0" hangingPunct="1">
+              <a:lnSpc>
+                <a:spcPct val="90000"/>
+              </a:lnSpc>
+              <a:spcBef>
+                <a:spcPts val="500"/>
+              </a:spcBef>
+              <a:spcAft>
+                <a:spcPts val="0"/>
+              </a:spcAft>
+              <a:buClrTx/>
+              <a:buSzTx/>
+              <a:buFont typeface="Arial" panose="020B0604020202020204" pitchFamily="34" charset="0"/>
+              <a:buChar char="•"/>
+              <a:tabLst/>
+              <a:defRPr/>
+            </a:pPr>
+            <a:r>
+              <a:rPr kumimoji="0" lang="en-US" sz="3800" b="0" i="0" u="none" strike="noStrike" kern="1200" cap="none" spc="0" normalizeH="0" baseline="0" noProof="0" dirty="0">
+                <a:ln>
+                  <a:noFill/>
+                </a:ln>
+                <a:solidFill>
+                  <a:prstClr val="black"/>
+                </a:solidFill>
+                <a:effectLst/>
+                <a:uLnTx/>
+                <a:uFillTx/>
+                <a:latin typeface="Times New Roman" panose="02020603050405020304" pitchFamily="18" charset="0"/>
+                <a:ea typeface="+mn-ea"/>
+                <a:cs typeface="Times New Roman" panose="02020603050405020304" pitchFamily="18" charset="0"/>
+              </a:rPr>
+              <a:t>JavaScript v8 </a:t>
+            </a:r>
+          </a:p>
+          <a:p>
+            <a:pPr marL="685800" marR="0" lvl="1" indent="-228600" algn="l" defTabSz="914400" rtl="0" eaLnBrk="1" fontAlgn="auto" latinLnBrk="0" hangingPunct="1">
+              <a:lnSpc>
+                <a:spcPct val="90000"/>
+              </a:lnSpc>
+              <a:spcBef>
+                <a:spcPts val="500"/>
+              </a:spcBef>
+              <a:spcAft>
+                <a:spcPts val="0"/>
+              </a:spcAft>
+              <a:buClrTx/>
+              <a:buSzTx/>
+              <a:buFont typeface="Arial" panose="020B0604020202020204" pitchFamily="34" charset="0"/>
+              <a:buChar char="•"/>
+              <a:tabLst/>
+              <a:defRPr/>
+            </a:pPr>
+            <a:r>
+              <a:rPr lang="en-US" sz="3800" dirty="0" err="1">
+                <a:solidFill>
+                  <a:prstClr val="black"/>
+                </a:solidFill>
+                <a:latin typeface="Times New Roman" panose="02020603050405020304" pitchFamily="18" charset="0"/>
+                <a:cs typeface="Times New Roman" panose="02020603050405020304" pitchFamily="18" charset="0"/>
+              </a:rPr>
+              <a:t>jsp</a:t>
+            </a:r>
+            <a:endParaRPr kumimoji="0" lang="en-US" sz="3800" b="0" i="0" u="none" strike="noStrike" kern="1200" cap="none" spc="0" normalizeH="0" baseline="0" noProof="0" dirty="0">
+              <a:ln>
+                <a:noFill/>
+              </a:ln>
+              <a:solidFill>
+                <a:prstClr val="black"/>
+              </a:solidFill>
+              <a:effectLst/>
+              <a:uLnTx/>
+              <a:uFillTx/>
+              <a:latin typeface="Times New Roman" panose="02020603050405020304" pitchFamily="18" charset="0"/>
+              <a:ea typeface="+mn-ea"/>
+              <a:cs typeface="Times New Roman" panose="02020603050405020304" pitchFamily="18" charset="0"/>
+            </a:endParaRPr>
+          </a:p>
+          <a:p>
+            <a:pPr marL="228600" marR="0" lvl="0" indent="-228600" algn="l" defTabSz="914400" rtl="0" eaLnBrk="1" fontAlgn="auto" latinLnBrk="0" hangingPunct="1">
+              <a:lnSpc>
+                <a:spcPct val="90000"/>
+              </a:lnSpc>
+              <a:spcBef>
+                <a:spcPts val="1000"/>
+              </a:spcBef>
+              <a:spcAft>
+                <a:spcPts val="0"/>
+              </a:spcAft>
+              <a:buClrTx/>
+              <a:buSzTx/>
+              <a:buFont typeface="Wingdings" panose="05000000000000000000" pitchFamily="2" charset="2"/>
+              <a:buChar char="Ø"/>
+              <a:tabLst/>
+              <a:defRPr/>
+            </a:pPr>
+            <a:r>
+              <a:rPr kumimoji="0" lang="en-US" sz="2800" b="0" i="0" u="none" strike="noStrike" kern="1200" cap="none" spc="0" normalizeH="0" baseline="0" noProof="0" dirty="0">
+                <a:ln>
+                  <a:noFill/>
+                </a:ln>
+                <a:solidFill>
+                  <a:prstClr val="black"/>
+                </a:solidFill>
+                <a:effectLst/>
+                <a:uLnTx/>
+                <a:uFillTx/>
+                <a:latin typeface="Times New Roman" panose="02020603050405020304" pitchFamily="18" charset="0"/>
+                <a:ea typeface="+mn-ea"/>
+                <a:cs typeface="Times New Roman" panose="02020603050405020304" pitchFamily="18" charset="0"/>
+              </a:rPr>
+              <a:t> </a:t>
+            </a:r>
+            <a:r>
+              <a:rPr kumimoji="0" lang="en-US" sz="3800" b="1" i="0" u="none" strike="noStrike" kern="1200" cap="none" spc="0" normalizeH="0" baseline="0" noProof="0" dirty="0">
+                <a:ln>
+                  <a:noFill/>
+                </a:ln>
+                <a:solidFill>
+                  <a:prstClr val="black"/>
+                </a:solidFill>
+                <a:effectLst/>
+                <a:uLnTx/>
+                <a:uFillTx/>
+                <a:latin typeface="Times New Roman" panose="02020603050405020304" pitchFamily="18" charset="0"/>
+                <a:ea typeface="+mn-ea"/>
+                <a:cs typeface="Times New Roman" panose="02020603050405020304" pitchFamily="18" charset="0"/>
+              </a:rPr>
+              <a:t>Backend tools</a:t>
+            </a:r>
+          </a:p>
+          <a:p>
+            <a:pPr marL="685800" marR="0" lvl="1" indent="-228600" algn="l" defTabSz="914400" rtl="0" eaLnBrk="1" fontAlgn="auto" latinLnBrk="0" hangingPunct="1">
+              <a:lnSpc>
+                <a:spcPct val="90000"/>
+              </a:lnSpc>
+              <a:spcBef>
+                <a:spcPts val="500"/>
+              </a:spcBef>
+              <a:spcAft>
+                <a:spcPts val="0"/>
+              </a:spcAft>
+              <a:buClrTx/>
+              <a:buSzTx/>
+              <a:buFont typeface="Arial" panose="020B0604020202020204" pitchFamily="34" charset="0"/>
+              <a:buChar char="•"/>
+              <a:tabLst/>
+              <a:defRPr/>
+            </a:pPr>
+            <a:r>
+              <a:rPr lang="en-US" sz="3800" dirty="0">
+                <a:solidFill>
+                  <a:prstClr val="black"/>
+                </a:solidFill>
+                <a:latin typeface="Times New Roman" panose="02020603050405020304" pitchFamily="18" charset="0"/>
+                <a:cs typeface="Times New Roman" panose="02020603050405020304" pitchFamily="18" charset="0"/>
+              </a:rPr>
+              <a:t>Java EE v8 (servlet )</a:t>
+            </a:r>
+            <a:endParaRPr kumimoji="0" lang="en-US" sz="3800" b="0" i="0" u="none" strike="noStrike" kern="1200" cap="none" spc="0" normalizeH="0" baseline="0" noProof="0" dirty="0">
+              <a:ln>
+                <a:noFill/>
+              </a:ln>
+              <a:solidFill>
+                <a:prstClr val="black"/>
+              </a:solidFill>
+              <a:effectLst/>
+              <a:uLnTx/>
+              <a:uFillTx/>
+              <a:latin typeface="Times New Roman" panose="02020603050405020304" pitchFamily="18" charset="0"/>
+              <a:ea typeface="+mn-ea"/>
+              <a:cs typeface="Times New Roman" panose="02020603050405020304" pitchFamily="18" charset="0"/>
+            </a:endParaRPr>
+          </a:p>
+          <a:p>
+            <a:pPr marL="685800" marR="0" lvl="1" indent="-228600" algn="l" defTabSz="914400" rtl="0" eaLnBrk="1" fontAlgn="auto" latinLnBrk="0" hangingPunct="1">
+              <a:lnSpc>
+                <a:spcPct val="90000"/>
+              </a:lnSpc>
+              <a:spcBef>
+                <a:spcPts val="500"/>
+              </a:spcBef>
+              <a:spcAft>
+                <a:spcPts val="0"/>
+              </a:spcAft>
+              <a:buClrTx/>
+              <a:buSzTx/>
+              <a:buFont typeface="Arial" panose="020B0604020202020204" pitchFamily="34" charset="0"/>
+              <a:buChar char="•"/>
+              <a:tabLst/>
+              <a:defRPr/>
+            </a:pPr>
+            <a:r>
+              <a:rPr kumimoji="0" lang="en-US" sz="3800" b="0" i="0" u="none" strike="noStrike" kern="1200" cap="none" spc="0" normalizeH="0" baseline="0" noProof="0" dirty="0">
+                <a:ln>
+                  <a:noFill/>
+                </a:ln>
+                <a:solidFill>
+                  <a:prstClr val="black"/>
+                </a:solidFill>
+                <a:effectLst/>
+                <a:uLnTx/>
+                <a:uFillTx/>
+                <a:latin typeface="Times New Roman" panose="02020603050405020304" pitchFamily="18" charset="0"/>
+                <a:ea typeface="+mn-ea"/>
+                <a:cs typeface="Times New Roman" panose="02020603050405020304" pitchFamily="18" charset="0"/>
+              </a:rPr>
+              <a:t>MySQL 8.0</a:t>
+            </a:r>
+          </a:p>
+          <a:p>
+            <a:pPr marL="228600" marR="0" lvl="0" indent="-228600" algn="l" defTabSz="914400" rtl="0" eaLnBrk="1" fontAlgn="auto" latinLnBrk="0" hangingPunct="1">
+              <a:lnSpc>
+                <a:spcPct val="90000"/>
+              </a:lnSpc>
+              <a:spcBef>
+                <a:spcPts val="1000"/>
+              </a:spcBef>
+              <a:spcAft>
+                <a:spcPts val="0"/>
+              </a:spcAft>
+              <a:buClrTx/>
+              <a:buSzTx/>
+              <a:buFont typeface="Wingdings" panose="05000000000000000000" pitchFamily="2" charset="2"/>
+              <a:buChar char="Ø"/>
+              <a:tabLst/>
+              <a:defRPr/>
+            </a:pPr>
+            <a:r>
+              <a:rPr kumimoji="0" lang="en-US" sz="3800" b="0" i="0" u="none" strike="noStrike" kern="1200" cap="none" spc="0" normalizeH="0" baseline="0" noProof="0" dirty="0">
+                <a:ln>
+                  <a:noFill/>
+                </a:ln>
+                <a:solidFill>
+                  <a:prstClr val="black"/>
+                </a:solidFill>
+                <a:effectLst/>
+                <a:uLnTx/>
+                <a:uFillTx/>
+                <a:latin typeface="Times New Roman" panose="02020603050405020304" pitchFamily="18" charset="0"/>
+                <a:ea typeface="+mn-ea"/>
+                <a:cs typeface="Times New Roman" panose="02020603050405020304" pitchFamily="18" charset="0"/>
+              </a:rPr>
+              <a:t> </a:t>
+            </a:r>
+            <a:r>
+              <a:rPr kumimoji="0" lang="en-US" sz="3800" b="1" i="0" u="none" strike="noStrike" kern="1200" cap="none" spc="0" normalizeH="0" baseline="0" noProof="0" dirty="0">
+                <a:ln>
+                  <a:noFill/>
+                </a:ln>
+                <a:solidFill>
+                  <a:prstClr val="black"/>
+                </a:solidFill>
+                <a:effectLst/>
+                <a:uLnTx/>
+                <a:uFillTx/>
+                <a:latin typeface="Times New Roman" panose="02020603050405020304" pitchFamily="18" charset="0"/>
+                <a:ea typeface="+mn-ea"/>
+                <a:cs typeface="Times New Roman" panose="02020603050405020304" pitchFamily="18" charset="0"/>
+              </a:rPr>
+              <a:t>Server</a:t>
+            </a:r>
+          </a:p>
+          <a:p>
+            <a:pPr lvl="1" algn="l">
+              <a:defRPr/>
+            </a:pPr>
+            <a:r>
+              <a:rPr lang="en-US" sz="3400" dirty="0">
+                <a:latin typeface="Times New Roman" panose="02020603050405020304" pitchFamily="18" charset="0"/>
+                <a:cs typeface="Times New Roman" panose="02020603050405020304" pitchFamily="18" charset="0"/>
+              </a:rPr>
+              <a:t>Tomcat 8.5.</a:t>
+            </a:r>
+            <a:endParaRPr kumimoji="0" lang="en-US" sz="3400" b="0" i="0" u="none" strike="noStrike" kern="1200" cap="none" spc="0" normalizeH="0" baseline="0" noProof="0" dirty="0">
+              <a:ln>
+                <a:noFill/>
+              </a:ln>
+              <a:solidFill>
+                <a:prstClr val="black"/>
+              </a:solidFill>
+              <a:effectLst/>
+              <a:uLnTx/>
+              <a:uFillTx/>
+              <a:latin typeface="Times New Roman" panose="02020603050405020304" pitchFamily="18" charset="0"/>
+              <a:cs typeface="Times New Roman" panose="02020603050405020304" pitchFamily="18" charset="0"/>
+            </a:endParaRPr>
+          </a:p>
+          <a:p>
+            <a:pPr marL="228600" marR="0" lvl="0" indent="-228600" algn="l" defTabSz="914400" rtl="0" eaLnBrk="1" fontAlgn="auto" latinLnBrk="0" hangingPunct="1">
+              <a:lnSpc>
+                <a:spcPct val="90000"/>
+              </a:lnSpc>
+              <a:spcBef>
+                <a:spcPts val="1000"/>
+              </a:spcBef>
+              <a:spcAft>
+                <a:spcPts val="0"/>
+              </a:spcAft>
+              <a:buClrTx/>
+              <a:buSzTx/>
+              <a:buFont typeface="Wingdings" panose="05000000000000000000" pitchFamily="2" charset="2"/>
+              <a:buChar char="Ø"/>
+              <a:tabLst/>
+              <a:defRPr/>
+            </a:pPr>
+            <a:r>
+              <a:rPr kumimoji="0" lang="en-US" sz="3800" b="1" i="0" u="none" strike="noStrike" kern="1200" cap="none" spc="0" normalizeH="0" baseline="0" noProof="0" dirty="0">
+                <a:ln>
+                  <a:noFill/>
+                </a:ln>
+                <a:solidFill>
+                  <a:prstClr val="black"/>
+                </a:solidFill>
+                <a:effectLst/>
+                <a:uLnTx/>
+                <a:uFillTx/>
+                <a:latin typeface="Times New Roman" panose="02020603050405020304" pitchFamily="18" charset="0"/>
+                <a:ea typeface="+mn-ea"/>
+                <a:cs typeface="Times New Roman" panose="02020603050405020304" pitchFamily="18" charset="0"/>
+              </a:rPr>
+              <a:t>Others</a:t>
+            </a:r>
+          </a:p>
+          <a:p>
+            <a:pPr marL="685800" marR="0" lvl="1" indent="-228600" algn="l" defTabSz="914400" rtl="0" eaLnBrk="1" fontAlgn="auto" latinLnBrk="0" hangingPunct="1">
+              <a:lnSpc>
+                <a:spcPct val="90000"/>
+              </a:lnSpc>
+              <a:spcBef>
+                <a:spcPts val="500"/>
+              </a:spcBef>
+              <a:spcAft>
+                <a:spcPts val="0"/>
+              </a:spcAft>
+              <a:buClrTx/>
+              <a:buSzTx/>
+              <a:buFont typeface="Arial" panose="020B0604020202020204" pitchFamily="34" charset="0"/>
+              <a:buChar char="•"/>
+              <a:tabLst/>
+              <a:defRPr/>
+            </a:pPr>
+            <a:r>
+              <a:rPr lang="en-US" sz="3800" dirty="0">
+                <a:solidFill>
+                  <a:prstClr val="black"/>
+                </a:solidFill>
+                <a:latin typeface="Times New Roman" panose="02020603050405020304" pitchFamily="18" charset="0"/>
+                <a:cs typeface="Times New Roman" panose="02020603050405020304" pitchFamily="18" charset="0"/>
+              </a:rPr>
+              <a:t>NetBeans 12.6</a:t>
+            </a:r>
+            <a:endParaRPr kumimoji="0" lang="en-US" sz="3800" b="0" i="0" u="none" strike="noStrike" kern="1200" cap="none" spc="0" normalizeH="0" baseline="0" noProof="0" dirty="0">
+              <a:ln>
+                <a:noFill/>
+              </a:ln>
+              <a:solidFill>
+                <a:prstClr val="black"/>
+              </a:solidFill>
+              <a:effectLst/>
+              <a:uLnTx/>
+              <a:uFillTx/>
+              <a:latin typeface="Times New Roman" panose="02020603050405020304" pitchFamily="18" charset="0"/>
+              <a:ea typeface="+mn-ea"/>
+              <a:cs typeface="Times New Roman" panose="02020603050405020304" pitchFamily="18" charset="0"/>
+            </a:endParaRPr>
+          </a:p>
+          <a:p>
+            <a:pPr marL="685800" marR="0" lvl="1" indent="-228600" algn="l" defTabSz="914400" rtl="0" eaLnBrk="1" fontAlgn="auto" latinLnBrk="0" hangingPunct="1">
+              <a:lnSpc>
+                <a:spcPct val="90000"/>
+              </a:lnSpc>
+              <a:spcBef>
+                <a:spcPts val="500"/>
+              </a:spcBef>
+              <a:spcAft>
+                <a:spcPts val="0"/>
+              </a:spcAft>
+              <a:buClrTx/>
+              <a:buSzTx/>
+              <a:buFont typeface="Arial" panose="020B0604020202020204" pitchFamily="34" charset="0"/>
+              <a:buChar char="•"/>
+              <a:tabLst/>
+              <a:defRPr/>
+            </a:pPr>
+            <a:r>
+              <a:rPr kumimoji="0" lang="en-US" sz="3800" b="0" i="0" u="none" strike="noStrike" kern="1200" cap="none" spc="0" normalizeH="0" baseline="0" noProof="0" dirty="0">
+                <a:ln>
+                  <a:noFill/>
+                </a:ln>
+                <a:solidFill>
+                  <a:prstClr val="black"/>
+                </a:solidFill>
+                <a:effectLst/>
+                <a:uLnTx/>
+                <a:uFillTx/>
+                <a:latin typeface="Times New Roman" panose="02020603050405020304" pitchFamily="18" charset="0"/>
+                <a:ea typeface="+mn-ea"/>
+                <a:cs typeface="Times New Roman" panose="02020603050405020304" pitchFamily="18" charset="0"/>
+              </a:rPr>
+              <a:t>Git and GitHub</a:t>
+            </a:r>
+          </a:p>
+          <a:p>
+            <a:pPr marL="228600" marR="0" lvl="0" indent="-228600" algn="l" defTabSz="914400" rtl="0" eaLnBrk="1" fontAlgn="auto" latinLnBrk="0" hangingPunct="1">
+              <a:lnSpc>
+                <a:spcPct val="90000"/>
+              </a:lnSpc>
+              <a:spcBef>
+                <a:spcPts val="1000"/>
+              </a:spcBef>
+              <a:spcAft>
+                <a:spcPts val="0"/>
+              </a:spcAft>
+              <a:buClrTx/>
+              <a:buSzTx/>
+              <a:buFont typeface="Wingdings" panose="05000000000000000000" pitchFamily="2" charset="2"/>
+              <a:buChar char="Ø"/>
+              <a:tabLst/>
+              <a:defRPr/>
+            </a:pPr>
+            <a:r>
+              <a:rPr kumimoji="0" lang="en-US" sz="2800" b="0" i="0" u="none" strike="noStrike" kern="1200" cap="none" spc="0" normalizeH="0" baseline="0" noProof="0" dirty="0">
+                <a:ln>
+                  <a:noFill/>
+                </a:ln>
+                <a:solidFill>
+                  <a:prstClr val="black"/>
+                </a:solidFill>
+                <a:effectLst/>
+                <a:uLnTx/>
+                <a:uFillTx/>
+                <a:latin typeface="Times New Roman" panose="02020603050405020304" pitchFamily="18" charset="0"/>
+                <a:ea typeface="+mn-ea"/>
+                <a:cs typeface="Times New Roman" panose="02020603050405020304" pitchFamily="18" charset="0"/>
+              </a:rPr>
+              <a:t> </a:t>
+            </a:r>
+            <a:r>
+              <a:rPr kumimoji="0" lang="en-US" sz="3800" b="1" i="0" u="none" strike="noStrike" kern="1200" cap="none" spc="0" normalizeH="0" baseline="0" noProof="0" dirty="0">
+                <a:ln>
+                  <a:noFill/>
+                </a:ln>
+                <a:solidFill>
+                  <a:prstClr val="black"/>
+                </a:solidFill>
+                <a:effectLst/>
+                <a:uLnTx/>
+                <a:uFillTx/>
+                <a:latin typeface="Times New Roman" panose="02020603050405020304" pitchFamily="18" charset="0"/>
+                <a:ea typeface="+mn-ea"/>
+                <a:cs typeface="Times New Roman" panose="02020603050405020304" pitchFamily="18" charset="0"/>
+              </a:rPr>
+              <a:t>Methodology</a:t>
+            </a:r>
+          </a:p>
+          <a:p>
+            <a:pPr marL="685800" marR="0" lvl="1" indent="-228600" algn="l" defTabSz="914400" rtl="0" eaLnBrk="1" fontAlgn="auto" latinLnBrk="0" hangingPunct="1">
+              <a:lnSpc>
+                <a:spcPct val="90000"/>
+              </a:lnSpc>
+              <a:spcBef>
+                <a:spcPts val="500"/>
+              </a:spcBef>
+              <a:spcAft>
+                <a:spcPts val="0"/>
+              </a:spcAft>
+              <a:buClrTx/>
+              <a:buSzTx/>
+              <a:buFont typeface="Arial" panose="020B0604020202020204" pitchFamily="34" charset="0"/>
+              <a:buChar char="•"/>
+              <a:tabLst/>
+              <a:defRPr/>
+            </a:pPr>
+            <a:r>
+              <a:rPr lang="en-US" sz="3800" dirty="0">
+                <a:solidFill>
+                  <a:prstClr val="black"/>
+                </a:solidFill>
+                <a:latin typeface="Times New Roman" panose="02020603050405020304" pitchFamily="18" charset="0"/>
+                <a:cs typeface="Times New Roman" panose="02020603050405020304" pitchFamily="18" charset="0"/>
+              </a:rPr>
+              <a:t>Waterfall model</a:t>
+            </a:r>
+            <a:endParaRPr lang="en-US" sz="3800" dirty="0"/>
+          </a:p>
+        </p:txBody>
+      </p:sp>
+      <p:sp>
+        <p:nvSpPr>
+          <p:cNvPr id="5" name="Slide Number Placeholder 4">
+            <a:extLst>
+              <a:ext uri="{FF2B5EF4-FFF2-40B4-BE49-F238E27FC236}">
+                <a16:creationId xmlns:a16="http://schemas.microsoft.com/office/drawing/2014/main" id="{3D285344-DEA0-4B96-A253-8DB5BC90716D}"/>
+              </a:ext>
+            </a:extLst>
+          </p:cNvPr>
+          <p:cNvSpPr>
+            <a:spLocks noGrp="1"/>
+          </p:cNvSpPr>
+          <p:nvPr>
+            <p:ph type="sldNum" sz="quarter" idx="12"/>
+          </p:nvPr>
+        </p:nvSpPr>
+        <p:spPr/>
+        <p:txBody>
+          <a:bodyPr/>
+          <a:lstStyle/>
+          <a:p>
+            <a:fld id="{7A7E991E-64BF-47E2-9E90-5B64348DCA50}" type="slidenum">
+              <a:rPr lang="en-US" sz="2800" b="1" smtClean="0"/>
+              <a:t>6</a:t>
+            </a:fld>
+            <a:endParaRPr lang="en-US" sz="2800" b="1" dirty="0"/>
+          </a:p>
+        </p:txBody>
+      </p:sp>
+    </p:spTree>
+    <p:extLst>
+      <p:ext uri="{BB962C8B-B14F-4D97-AF65-F5344CB8AC3E}">
+        <p14:creationId xmlns:p14="http://schemas.microsoft.com/office/powerpoint/2010/main" val="559600348"/>
+      </p:ext>
+    </p:extLst>
+  </p:cSld>
+  <p:clrMapOvr>
+    <a:masterClrMapping/>
+  </p:clrMapOvr>
+</p:sld>
+</file>
+
+<file path=ppt/slides/slide7.xml><?xml version="1.0" encoding="utf-8"?>
 <p:sld xmlns:a="http://schemas.openxmlformats.org/drawingml/2006/main" xmlns:r="http://schemas.openxmlformats.org/officeDocument/2006/relationships" xmlns:p="http://schemas.openxmlformats.org/presentationml/2006/main">
   <p:cSld>
     <p:spTree>
@@ -5550,7 +6321,7 @@
           <a:p>
             <a:fld id="{7A7E991E-64BF-47E2-9E90-5B64348DCA50}" type="slidenum">
               <a:rPr lang="en-US" sz="2800" smtClean="0"/>
-              <a:t>6</a:t>
+              <a:t>7</a:t>
             </a:fld>
             <a:endParaRPr lang="en-US" sz="2800" dirty="0"/>
           </a:p>
@@ -5560,746 +6331,6 @@
     <p:extLst>
       <p:ext uri="{BB962C8B-B14F-4D97-AF65-F5344CB8AC3E}">
         <p14:creationId xmlns:p14="http://schemas.microsoft.com/office/powerpoint/2010/main" val="3780656609"/>
-      </p:ext>
-    </p:extLst>
-  </p:cSld>
-  <p:clrMapOvr>
-    <a:masterClrMapping/>
-  </p:clrMapOvr>
-</p:sld>
-</file>
-
-<file path=ppt/slides/slide7.xml><?xml version="1.0" encoding="utf-8"?>
-<p:sld xmlns:a="http://schemas.openxmlformats.org/drawingml/2006/main" xmlns:r="http://schemas.openxmlformats.org/officeDocument/2006/relationships" xmlns:p="http://schemas.openxmlformats.org/presentationml/2006/main">
-  <p:cSld>
-    <p:spTree>
-      <p:nvGrpSpPr>
-        <p:cNvPr id="1" name=""/>
-        <p:cNvGrpSpPr/>
-        <p:nvPr/>
-      </p:nvGrpSpPr>
-      <p:grpSpPr>
-        <a:xfrm>
-          <a:off x="0" y="0"/>
-          <a:ext cx="0" cy="0"/>
-          <a:chOff x="0" y="0"/>
-          <a:chExt cx="0" cy="0"/>
-        </a:xfrm>
-      </p:grpSpPr>
-      <p:sp>
-        <p:nvSpPr>
-          <p:cNvPr id="2" name="Title 1">
-            <a:extLst>
-              <a:ext uri="{FF2B5EF4-FFF2-40B4-BE49-F238E27FC236}">
-                <a16:creationId xmlns:a16="http://schemas.microsoft.com/office/drawing/2014/main" id="{140910CD-A693-4C4E-8E0A-4A830409B2A4}"/>
-              </a:ext>
-            </a:extLst>
-          </p:cNvPr>
-          <p:cNvSpPr>
-            <a:spLocks noGrp="1"/>
-          </p:cNvSpPr>
-          <p:nvPr>
-            <p:ph type="ctrTitle"/>
-          </p:nvPr>
-        </p:nvSpPr>
-        <p:spPr>
-          <a:xfrm>
-            <a:off x="515155" y="141667"/>
-            <a:ext cx="9972541" cy="965915"/>
-          </a:xfrm>
-        </p:spPr>
-        <p:txBody>
-          <a:bodyPr>
-            <a:normAutofit/>
-          </a:bodyPr>
-          <a:lstStyle/>
-          <a:p>
-            <a:pPr algn="l"/>
-            <a:r>
-              <a:rPr lang="en-US" sz="4800" b="1" dirty="0">
-                <a:latin typeface="Times New Roman" panose="02020603050405020304" pitchFamily="18" charset="0"/>
-                <a:cs typeface="Times New Roman" panose="02020603050405020304" pitchFamily="18" charset="0"/>
-              </a:rPr>
-              <a:t>Tools and Technology</a:t>
-            </a:r>
-            <a:endParaRPr lang="en-US" sz="4800" dirty="0"/>
-          </a:p>
-        </p:txBody>
-      </p:sp>
-      <p:sp>
-        <p:nvSpPr>
-          <p:cNvPr id="3" name="Subtitle 2">
-            <a:extLst>
-              <a:ext uri="{FF2B5EF4-FFF2-40B4-BE49-F238E27FC236}">
-                <a16:creationId xmlns:a16="http://schemas.microsoft.com/office/drawing/2014/main" id="{BE2009EE-B819-4E87-ADF5-8A6F668F97ED}"/>
-              </a:ext>
-            </a:extLst>
-          </p:cNvPr>
-          <p:cNvSpPr>
-            <a:spLocks noGrp="1"/>
-          </p:cNvSpPr>
-          <p:nvPr>
-            <p:ph type="subTitle" idx="1"/>
-          </p:nvPr>
-        </p:nvSpPr>
-        <p:spPr>
-          <a:xfrm>
-            <a:off x="1120462" y="1262130"/>
-            <a:ext cx="9547538" cy="5357611"/>
-          </a:xfrm>
-        </p:spPr>
-        <p:txBody>
-          <a:bodyPr>
-            <a:normAutofit fontScale="62500" lnSpcReduction="20000"/>
-          </a:bodyPr>
-          <a:lstStyle/>
-          <a:p>
-            <a:pPr marL="228600" marR="0" lvl="0" indent="-228600" algn="l" defTabSz="914400" rtl="0" eaLnBrk="1" fontAlgn="auto" latinLnBrk="0" hangingPunct="1">
-              <a:lnSpc>
-                <a:spcPct val="90000"/>
-              </a:lnSpc>
-              <a:spcBef>
-                <a:spcPts val="1000"/>
-              </a:spcBef>
-              <a:spcAft>
-                <a:spcPts val="0"/>
-              </a:spcAft>
-              <a:buClrTx/>
-              <a:buSzTx/>
-              <a:buFont typeface="Wingdings" panose="05000000000000000000" pitchFamily="2" charset="2"/>
-              <a:buChar char="Ø"/>
-              <a:tabLst/>
-              <a:defRPr/>
-            </a:pPr>
-            <a:r>
-              <a:rPr kumimoji="0" lang="en-US" sz="2800" b="0" i="0" u="none" strike="noStrike" kern="1200" cap="none" spc="0" normalizeH="0" baseline="0" noProof="0" dirty="0">
-                <a:ln>
-                  <a:noFill/>
-                </a:ln>
-                <a:solidFill>
-                  <a:prstClr val="black"/>
-                </a:solidFill>
-                <a:effectLst/>
-                <a:uLnTx/>
-                <a:uFillTx/>
-                <a:latin typeface="Times New Roman" panose="02020603050405020304" pitchFamily="18" charset="0"/>
-                <a:ea typeface="+mn-ea"/>
-                <a:cs typeface="Times New Roman" panose="02020603050405020304" pitchFamily="18" charset="0"/>
-              </a:rPr>
-              <a:t> </a:t>
-            </a:r>
-            <a:r>
-              <a:rPr kumimoji="0" lang="en-US" sz="3800" b="1" i="0" u="none" strike="noStrike" kern="1200" cap="none" spc="0" normalizeH="0" baseline="0" noProof="0" dirty="0">
-                <a:ln>
-                  <a:noFill/>
-                </a:ln>
-                <a:solidFill>
-                  <a:prstClr val="black"/>
-                </a:solidFill>
-                <a:effectLst/>
-                <a:uLnTx/>
-                <a:uFillTx/>
-                <a:latin typeface="Times New Roman" panose="02020603050405020304" pitchFamily="18" charset="0"/>
-                <a:ea typeface="+mn-ea"/>
-                <a:cs typeface="Times New Roman" panose="02020603050405020304" pitchFamily="18" charset="0"/>
-              </a:rPr>
-              <a:t>Frontend tools</a:t>
-            </a:r>
-          </a:p>
-          <a:p>
-            <a:pPr marL="685800" marR="0" lvl="1" indent="-228600" algn="l" defTabSz="914400" rtl="0" eaLnBrk="1" fontAlgn="auto" latinLnBrk="0" hangingPunct="1">
-              <a:lnSpc>
-                <a:spcPct val="90000"/>
-              </a:lnSpc>
-              <a:spcBef>
-                <a:spcPts val="500"/>
-              </a:spcBef>
-              <a:spcAft>
-                <a:spcPts val="0"/>
-              </a:spcAft>
-              <a:buClrTx/>
-              <a:buSzTx/>
-              <a:buFont typeface="Arial" panose="020B0604020202020204" pitchFamily="34" charset="0"/>
-              <a:buChar char="•"/>
-              <a:tabLst/>
-              <a:defRPr/>
-            </a:pPr>
-            <a:r>
-              <a:rPr kumimoji="0" lang="en-US" sz="3800" b="0" i="0" u="none" strike="noStrike" kern="1200" cap="none" spc="0" normalizeH="0" baseline="0" noProof="0" dirty="0">
-                <a:ln>
-                  <a:noFill/>
-                </a:ln>
-                <a:solidFill>
-                  <a:prstClr val="black"/>
-                </a:solidFill>
-                <a:effectLst/>
-                <a:uLnTx/>
-                <a:uFillTx/>
-                <a:latin typeface="Times New Roman" panose="02020603050405020304" pitchFamily="18" charset="0"/>
-                <a:ea typeface="+mn-ea"/>
-                <a:cs typeface="Times New Roman" panose="02020603050405020304" pitchFamily="18" charset="0"/>
-              </a:rPr>
-              <a:t>HTML5</a:t>
-            </a:r>
-          </a:p>
-          <a:p>
-            <a:pPr marL="685800" marR="0" lvl="1" indent="-228600" algn="l" defTabSz="914400" rtl="0" eaLnBrk="1" fontAlgn="auto" latinLnBrk="0" hangingPunct="1">
-              <a:lnSpc>
-                <a:spcPct val="90000"/>
-              </a:lnSpc>
-              <a:spcBef>
-                <a:spcPts val="500"/>
-              </a:spcBef>
-              <a:spcAft>
-                <a:spcPts val="0"/>
-              </a:spcAft>
-              <a:buClrTx/>
-              <a:buSzTx/>
-              <a:buFont typeface="Arial" panose="020B0604020202020204" pitchFamily="34" charset="0"/>
-              <a:buChar char="•"/>
-              <a:tabLst/>
-              <a:defRPr/>
-            </a:pPr>
-            <a:r>
-              <a:rPr kumimoji="0" lang="en-US" sz="3800" b="0" i="0" u="none" strike="noStrike" kern="1200" cap="none" spc="0" normalizeH="0" baseline="0" noProof="0" dirty="0">
-                <a:ln>
-                  <a:noFill/>
-                </a:ln>
-                <a:solidFill>
-                  <a:prstClr val="black"/>
-                </a:solidFill>
-                <a:effectLst/>
-                <a:uLnTx/>
-                <a:uFillTx/>
-                <a:latin typeface="Times New Roman" panose="02020603050405020304" pitchFamily="18" charset="0"/>
-                <a:ea typeface="+mn-ea"/>
-                <a:cs typeface="Times New Roman" panose="02020603050405020304" pitchFamily="18" charset="0"/>
-              </a:rPr>
-              <a:t>CSS3</a:t>
-            </a:r>
-          </a:p>
-          <a:p>
-            <a:pPr marL="685800" marR="0" lvl="1" indent="-228600" algn="l" defTabSz="914400" rtl="0" eaLnBrk="1" fontAlgn="auto" latinLnBrk="0" hangingPunct="1">
-              <a:lnSpc>
-                <a:spcPct val="90000"/>
-              </a:lnSpc>
-              <a:spcBef>
-                <a:spcPts val="500"/>
-              </a:spcBef>
-              <a:spcAft>
-                <a:spcPts val="0"/>
-              </a:spcAft>
-              <a:buClrTx/>
-              <a:buSzTx/>
-              <a:buFont typeface="Arial" panose="020B0604020202020204" pitchFamily="34" charset="0"/>
-              <a:buChar char="•"/>
-              <a:tabLst/>
-              <a:defRPr/>
-            </a:pPr>
-            <a:r>
-              <a:rPr kumimoji="0" lang="en-US" sz="3800" b="0" i="0" u="none" strike="noStrike" kern="1200" cap="none" spc="0" normalizeH="0" baseline="0" noProof="0" dirty="0">
-                <a:ln>
-                  <a:noFill/>
-                </a:ln>
-                <a:solidFill>
-                  <a:prstClr val="black"/>
-                </a:solidFill>
-                <a:effectLst/>
-                <a:uLnTx/>
-                <a:uFillTx/>
-                <a:latin typeface="Times New Roman" panose="02020603050405020304" pitchFamily="18" charset="0"/>
-                <a:ea typeface="+mn-ea"/>
-                <a:cs typeface="Times New Roman" panose="02020603050405020304" pitchFamily="18" charset="0"/>
-              </a:rPr>
-              <a:t>JavaScript v8 </a:t>
-            </a:r>
-          </a:p>
-          <a:p>
-            <a:pPr marL="685800" marR="0" lvl="1" indent="-228600" algn="l" defTabSz="914400" rtl="0" eaLnBrk="1" fontAlgn="auto" latinLnBrk="0" hangingPunct="1">
-              <a:lnSpc>
-                <a:spcPct val="90000"/>
-              </a:lnSpc>
-              <a:spcBef>
-                <a:spcPts val="500"/>
-              </a:spcBef>
-              <a:spcAft>
-                <a:spcPts val="0"/>
-              </a:spcAft>
-              <a:buClrTx/>
-              <a:buSzTx/>
-              <a:buFont typeface="Arial" panose="020B0604020202020204" pitchFamily="34" charset="0"/>
-              <a:buChar char="•"/>
-              <a:tabLst/>
-              <a:defRPr/>
-            </a:pPr>
-            <a:r>
-              <a:rPr lang="en-US" sz="3800" dirty="0" err="1">
-                <a:solidFill>
-                  <a:prstClr val="black"/>
-                </a:solidFill>
-                <a:latin typeface="Times New Roman" panose="02020603050405020304" pitchFamily="18" charset="0"/>
-                <a:cs typeface="Times New Roman" panose="02020603050405020304" pitchFamily="18" charset="0"/>
-              </a:rPr>
-              <a:t>jsp</a:t>
-            </a:r>
-            <a:endParaRPr kumimoji="0" lang="en-US" sz="3800" b="0" i="0" u="none" strike="noStrike" kern="1200" cap="none" spc="0" normalizeH="0" baseline="0" noProof="0" dirty="0">
-              <a:ln>
-                <a:noFill/>
-              </a:ln>
-              <a:solidFill>
-                <a:prstClr val="black"/>
-              </a:solidFill>
-              <a:effectLst/>
-              <a:uLnTx/>
-              <a:uFillTx/>
-              <a:latin typeface="Times New Roman" panose="02020603050405020304" pitchFamily="18" charset="0"/>
-              <a:ea typeface="+mn-ea"/>
-              <a:cs typeface="Times New Roman" panose="02020603050405020304" pitchFamily="18" charset="0"/>
-            </a:endParaRPr>
-          </a:p>
-          <a:p>
-            <a:pPr marL="228600" marR="0" lvl="0" indent="-228600" algn="l" defTabSz="914400" rtl="0" eaLnBrk="1" fontAlgn="auto" latinLnBrk="0" hangingPunct="1">
-              <a:lnSpc>
-                <a:spcPct val="90000"/>
-              </a:lnSpc>
-              <a:spcBef>
-                <a:spcPts val="1000"/>
-              </a:spcBef>
-              <a:spcAft>
-                <a:spcPts val="0"/>
-              </a:spcAft>
-              <a:buClrTx/>
-              <a:buSzTx/>
-              <a:buFont typeface="Wingdings" panose="05000000000000000000" pitchFamily="2" charset="2"/>
-              <a:buChar char="Ø"/>
-              <a:tabLst/>
-              <a:defRPr/>
-            </a:pPr>
-            <a:r>
-              <a:rPr kumimoji="0" lang="en-US" sz="2800" b="0" i="0" u="none" strike="noStrike" kern="1200" cap="none" spc="0" normalizeH="0" baseline="0" noProof="0" dirty="0">
-                <a:ln>
-                  <a:noFill/>
-                </a:ln>
-                <a:solidFill>
-                  <a:prstClr val="black"/>
-                </a:solidFill>
-                <a:effectLst/>
-                <a:uLnTx/>
-                <a:uFillTx/>
-                <a:latin typeface="Times New Roman" panose="02020603050405020304" pitchFamily="18" charset="0"/>
-                <a:ea typeface="+mn-ea"/>
-                <a:cs typeface="Times New Roman" panose="02020603050405020304" pitchFamily="18" charset="0"/>
-              </a:rPr>
-              <a:t> </a:t>
-            </a:r>
-            <a:r>
-              <a:rPr kumimoji="0" lang="en-US" sz="3800" b="1" i="0" u="none" strike="noStrike" kern="1200" cap="none" spc="0" normalizeH="0" baseline="0" noProof="0" dirty="0">
-                <a:ln>
-                  <a:noFill/>
-                </a:ln>
-                <a:solidFill>
-                  <a:prstClr val="black"/>
-                </a:solidFill>
-                <a:effectLst/>
-                <a:uLnTx/>
-                <a:uFillTx/>
-                <a:latin typeface="Times New Roman" panose="02020603050405020304" pitchFamily="18" charset="0"/>
-                <a:ea typeface="+mn-ea"/>
-                <a:cs typeface="Times New Roman" panose="02020603050405020304" pitchFamily="18" charset="0"/>
-              </a:rPr>
-              <a:t>Backend tools</a:t>
-            </a:r>
-          </a:p>
-          <a:p>
-            <a:pPr marL="685800" marR="0" lvl="1" indent="-228600" algn="l" defTabSz="914400" rtl="0" eaLnBrk="1" fontAlgn="auto" latinLnBrk="0" hangingPunct="1">
-              <a:lnSpc>
-                <a:spcPct val="90000"/>
-              </a:lnSpc>
-              <a:spcBef>
-                <a:spcPts val="500"/>
-              </a:spcBef>
-              <a:spcAft>
-                <a:spcPts val="0"/>
-              </a:spcAft>
-              <a:buClrTx/>
-              <a:buSzTx/>
-              <a:buFont typeface="Arial" panose="020B0604020202020204" pitchFamily="34" charset="0"/>
-              <a:buChar char="•"/>
-              <a:tabLst/>
-              <a:defRPr/>
-            </a:pPr>
-            <a:r>
-              <a:rPr lang="en-US" sz="3800" dirty="0">
-                <a:solidFill>
-                  <a:prstClr val="black"/>
-                </a:solidFill>
-                <a:latin typeface="Times New Roman" panose="02020603050405020304" pitchFamily="18" charset="0"/>
-                <a:cs typeface="Times New Roman" panose="02020603050405020304" pitchFamily="18" charset="0"/>
-              </a:rPr>
-              <a:t>Java EE v8 (servlet )</a:t>
-            </a:r>
-            <a:endParaRPr kumimoji="0" lang="en-US" sz="3800" b="0" i="0" u="none" strike="noStrike" kern="1200" cap="none" spc="0" normalizeH="0" baseline="0" noProof="0" dirty="0">
-              <a:ln>
-                <a:noFill/>
-              </a:ln>
-              <a:solidFill>
-                <a:prstClr val="black"/>
-              </a:solidFill>
-              <a:effectLst/>
-              <a:uLnTx/>
-              <a:uFillTx/>
-              <a:latin typeface="Times New Roman" panose="02020603050405020304" pitchFamily="18" charset="0"/>
-              <a:ea typeface="+mn-ea"/>
-              <a:cs typeface="Times New Roman" panose="02020603050405020304" pitchFamily="18" charset="0"/>
-            </a:endParaRPr>
-          </a:p>
-          <a:p>
-            <a:pPr marL="685800" marR="0" lvl="1" indent="-228600" algn="l" defTabSz="914400" rtl="0" eaLnBrk="1" fontAlgn="auto" latinLnBrk="0" hangingPunct="1">
-              <a:lnSpc>
-                <a:spcPct val="90000"/>
-              </a:lnSpc>
-              <a:spcBef>
-                <a:spcPts val="500"/>
-              </a:spcBef>
-              <a:spcAft>
-                <a:spcPts val="0"/>
-              </a:spcAft>
-              <a:buClrTx/>
-              <a:buSzTx/>
-              <a:buFont typeface="Arial" panose="020B0604020202020204" pitchFamily="34" charset="0"/>
-              <a:buChar char="•"/>
-              <a:tabLst/>
-              <a:defRPr/>
-            </a:pPr>
-            <a:r>
-              <a:rPr kumimoji="0" lang="en-US" sz="3800" b="0" i="0" u="none" strike="noStrike" kern="1200" cap="none" spc="0" normalizeH="0" baseline="0" noProof="0" dirty="0">
-                <a:ln>
-                  <a:noFill/>
-                </a:ln>
-                <a:solidFill>
-                  <a:prstClr val="black"/>
-                </a:solidFill>
-                <a:effectLst/>
-                <a:uLnTx/>
-                <a:uFillTx/>
-                <a:latin typeface="Times New Roman" panose="02020603050405020304" pitchFamily="18" charset="0"/>
-                <a:ea typeface="+mn-ea"/>
-                <a:cs typeface="Times New Roman" panose="02020603050405020304" pitchFamily="18" charset="0"/>
-              </a:rPr>
-              <a:t>MySQL 8.0</a:t>
-            </a:r>
-          </a:p>
-          <a:p>
-            <a:pPr marL="228600" marR="0" lvl="0" indent="-228600" algn="l" defTabSz="914400" rtl="0" eaLnBrk="1" fontAlgn="auto" latinLnBrk="0" hangingPunct="1">
-              <a:lnSpc>
-                <a:spcPct val="90000"/>
-              </a:lnSpc>
-              <a:spcBef>
-                <a:spcPts val="1000"/>
-              </a:spcBef>
-              <a:spcAft>
-                <a:spcPts val="0"/>
-              </a:spcAft>
-              <a:buClrTx/>
-              <a:buSzTx/>
-              <a:buFont typeface="Wingdings" panose="05000000000000000000" pitchFamily="2" charset="2"/>
-              <a:buChar char="Ø"/>
-              <a:tabLst/>
-              <a:defRPr/>
-            </a:pPr>
-            <a:r>
-              <a:rPr kumimoji="0" lang="en-US" sz="3800" b="0" i="0" u="none" strike="noStrike" kern="1200" cap="none" spc="0" normalizeH="0" baseline="0" noProof="0" dirty="0">
-                <a:ln>
-                  <a:noFill/>
-                </a:ln>
-                <a:solidFill>
-                  <a:prstClr val="black"/>
-                </a:solidFill>
-                <a:effectLst/>
-                <a:uLnTx/>
-                <a:uFillTx/>
-                <a:latin typeface="Times New Roman" panose="02020603050405020304" pitchFamily="18" charset="0"/>
-                <a:ea typeface="+mn-ea"/>
-                <a:cs typeface="Times New Roman" panose="02020603050405020304" pitchFamily="18" charset="0"/>
-              </a:rPr>
-              <a:t> </a:t>
-            </a:r>
-            <a:r>
-              <a:rPr kumimoji="0" lang="en-US" sz="3800" b="1" i="0" u="none" strike="noStrike" kern="1200" cap="none" spc="0" normalizeH="0" baseline="0" noProof="0" dirty="0">
-                <a:ln>
-                  <a:noFill/>
-                </a:ln>
-                <a:solidFill>
-                  <a:prstClr val="black"/>
-                </a:solidFill>
-                <a:effectLst/>
-                <a:uLnTx/>
-                <a:uFillTx/>
-                <a:latin typeface="Times New Roman" panose="02020603050405020304" pitchFamily="18" charset="0"/>
-                <a:ea typeface="+mn-ea"/>
-                <a:cs typeface="Times New Roman" panose="02020603050405020304" pitchFamily="18" charset="0"/>
-              </a:rPr>
-              <a:t>Server</a:t>
-            </a:r>
-          </a:p>
-          <a:p>
-            <a:pPr lvl="1" algn="l">
-              <a:defRPr/>
-            </a:pPr>
-            <a:r>
-              <a:rPr lang="en-US" sz="3400" dirty="0">
-                <a:latin typeface="Times New Roman" panose="02020603050405020304" pitchFamily="18" charset="0"/>
-                <a:cs typeface="Times New Roman" panose="02020603050405020304" pitchFamily="18" charset="0"/>
-              </a:rPr>
-              <a:t>Tomcat 8.5.</a:t>
-            </a:r>
-            <a:endParaRPr kumimoji="0" lang="en-US" sz="3400" b="0" i="0" u="none" strike="noStrike" kern="1200" cap="none" spc="0" normalizeH="0" baseline="0" noProof="0" dirty="0">
-              <a:ln>
-                <a:noFill/>
-              </a:ln>
-              <a:solidFill>
-                <a:prstClr val="black"/>
-              </a:solidFill>
-              <a:effectLst/>
-              <a:uLnTx/>
-              <a:uFillTx/>
-              <a:latin typeface="Times New Roman" panose="02020603050405020304" pitchFamily="18" charset="0"/>
-              <a:cs typeface="Times New Roman" panose="02020603050405020304" pitchFamily="18" charset="0"/>
-            </a:endParaRPr>
-          </a:p>
-          <a:p>
-            <a:pPr marL="228600" marR="0" lvl="0" indent="-228600" algn="l" defTabSz="914400" rtl="0" eaLnBrk="1" fontAlgn="auto" latinLnBrk="0" hangingPunct="1">
-              <a:lnSpc>
-                <a:spcPct val="90000"/>
-              </a:lnSpc>
-              <a:spcBef>
-                <a:spcPts val="1000"/>
-              </a:spcBef>
-              <a:spcAft>
-                <a:spcPts val="0"/>
-              </a:spcAft>
-              <a:buClrTx/>
-              <a:buSzTx/>
-              <a:buFont typeface="Wingdings" panose="05000000000000000000" pitchFamily="2" charset="2"/>
-              <a:buChar char="Ø"/>
-              <a:tabLst/>
-              <a:defRPr/>
-            </a:pPr>
-            <a:r>
-              <a:rPr kumimoji="0" lang="en-US" sz="3800" b="1" i="0" u="none" strike="noStrike" kern="1200" cap="none" spc="0" normalizeH="0" baseline="0" noProof="0" dirty="0">
-                <a:ln>
-                  <a:noFill/>
-                </a:ln>
-                <a:solidFill>
-                  <a:prstClr val="black"/>
-                </a:solidFill>
-                <a:effectLst/>
-                <a:uLnTx/>
-                <a:uFillTx/>
-                <a:latin typeface="Times New Roman" panose="02020603050405020304" pitchFamily="18" charset="0"/>
-                <a:ea typeface="+mn-ea"/>
-                <a:cs typeface="Times New Roman" panose="02020603050405020304" pitchFamily="18" charset="0"/>
-              </a:rPr>
-              <a:t>Others</a:t>
-            </a:r>
-          </a:p>
-          <a:p>
-            <a:pPr marL="685800" marR="0" lvl="1" indent="-228600" algn="l" defTabSz="914400" rtl="0" eaLnBrk="1" fontAlgn="auto" latinLnBrk="0" hangingPunct="1">
-              <a:lnSpc>
-                <a:spcPct val="90000"/>
-              </a:lnSpc>
-              <a:spcBef>
-                <a:spcPts val="500"/>
-              </a:spcBef>
-              <a:spcAft>
-                <a:spcPts val="0"/>
-              </a:spcAft>
-              <a:buClrTx/>
-              <a:buSzTx/>
-              <a:buFont typeface="Arial" panose="020B0604020202020204" pitchFamily="34" charset="0"/>
-              <a:buChar char="•"/>
-              <a:tabLst/>
-              <a:defRPr/>
-            </a:pPr>
-            <a:r>
-              <a:rPr lang="en-US" sz="3800" dirty="0">
-                <a:solidFill>
-                  <a:prstClr val="black"/>
-                </a:solidFill>
-                <a:latin typeface="Times New Roman" panose="02020603050405020304" pitchFamily="18" charset="0"/>
-                <a:cs typeface="Times New Roman" panose="02020603050405020304" pitchFamily="18" charset="0"/>
-              </a:rPr>
-              <a:t>NetBeans 12.6</a:t>
-            </a:r>
-            <a:endParaRPr kumimoji="0" lang="en-US" sz="3800" b="0" i="0" u="none" strike="noStrike" kern="1200" cap="none" spc="0" normalizeH="0" baseline="0" noProof="0" dirty="0">
-              <a:ln>
-                <a:noFill/>
-              </a:ln>
-              <a:solidFill>
-                <a:prstClr val="black"/>
-              </a:solidFill>
-              <a:effectLst/>
-              <a:uLnTx/>
-              <a:uFillTx/>
-              <a:latin typeface="Times New Roman" panose="02020603050405020304" pitchFamily="18" charset="0"/>
-              <a:ea typeface="+mn-ea"/>
-              <a:cs typeface="Times New Roman" panose="02020603050405020304" pitchFamily="18" charset="0"/>
-            </a:endParaRPr>
-          </a:p>
-          <a:p>
-            <a:pPr marL="685800" marR="0" lvl="1" indent="-228600" algn="l" defTabSz="914400" rtl="0" eaLnBrk="1" fontAlgn="auto" latinLnBrk="0" hangingPunct="1">
-              <a:lnSpc>
-                <a:spcPct val="90000"/>
-              </a:lnSpc>
-              <a:spcBef>
-                <a:spcPts val="500"/>
-              </a:spcBef>
-              <a:spcAft>
-                <a:spcPts val="0"/>
-              </a:spcAft>
-              <a:buClrTx/>
-              <a:buSzTx/>
-              <a:buFont typeface="Arial" panose="020B0604020202020204" pitchFamily="34" charset="0"/>
-              <a:buChar char="•"/>
-              <a:tabLst/>
-              <a:defRPr/>
-            </a:pPr>
-            <a:r>
-              <a:rPr kumimoji="0" lang="en-US" sz="3800" b="0" i="0" u="none" strike="noStrike" kern="1200" cap="none" spc="0" normalizeH="0" baseline="0" noProof="0" dirty="0">
-                <a:ln>
-                  <a:noFill/>
-                </a:ln>
-                <a:solidFill>
-                  <a:prstClr val="black"/>
-                </a:solidFill>
-                <a:effectLst/>
-                <a:uLnTx/>
-                <a:uFillTx/>
-                <a:latin typeface="Times New Roman" panose="02020603050405020304" pitchFamily="18" charset="0"/>
-                <a:ea typeface="+mn-ea"/>
-                <a:cs typeface="Times New Roman" panose="02020603050405020304" pitchFamily="18" charset="0"/>
-              </a:rPr>
-              <a:t>Git and GitHub</a:t>
-            </a:r>
-          </a:p>
-          <a:p>
-            <a:pPr marL="228600" marR="0" lvl="0" indent="-228600" algn="l" defTabSz="914400" rtl="0" eaLnBrk="1" fontAlgn="auto" latinLnBrk="0" hangingPunct="1">
-              <a:lnSpc>
-                <a:spcPct val="90000"/>
-              </a:lnSpc>
-              <a:spcBef>
-                <a:spcPts val="1000"/>
-              </a:spcBef>
-              <a:spcAft>
-                <a:spcPts val="0"/>
-              </a:spcAft>
-              <a:buClrTx/>
-              <a:buSzTx/>
-              <a:buFont typeface="Wingdings" panose="05000000000000000000" pitchFamily="2" charset="2"/>
-              <a:buChar char="Ø"/>
-              <a:tabLst/>
-              <a:defRPr/>
-            </a:pPr>
-            <a:r>
-              <a:rPr kumimoji="0" lang="en-US" sz="2800" b="0" i="0" u="none" strike="noStrike" kern="1200" cap="none" spc="0" normalizeH="0" baseline="0" noProof="0" dirty="0">
-                <a:ln>
-                  <a:noFill/>
-                </a:ln>
-                <a:solidFill>
-                  <a:prstClr val="black"/>
-                </a:solidFill>
-                <a:effectLst/>
-                <a:uLnTx/>
-                <a:uFillTx/>
-                <a:latin typeface="Times New Roman" panose="02020603050405020304" pitchFamily="18" charset="0"/>
-                <a:ea typeface="+mn-ea"/>
-                <a:cs typeface="Times New Roman" panose="02020603050405020304" pitchFamily="18" charset="0"/>
-              </a:rPr>
-              <a:t> </a:t>
-            </a:r>
-            <a:r>
-              <a:rPr kumimoji="0" lang="en-US" sz="3800" b="1" i="0" u="none" strike="noStrike" kern="1200" cap="none" spc="0" normalizeH="0" baseline="0" noProof="0" dirty="0">
-                <a:ln>
-                  <a:noFill/>
-                </a:ln>
-                <a:solidFill>
-                  <a:prstClr val="black"/>
-                </a:solidFill>
-                <a:effectLst/>
-                <a:uLnTx/>
-                <a:uFillTx/>
-                <a:latin typeface="Times New Roman" panose="02020603050405020304" pitchFamily="18" charset="0"/>
-                <a:ea typeface="+mn-ea"/>
-                <a:cs typeface="Times New Roman" panose="02020603050405020304" pitchFamily="18" charset="0"/>
-              </a:rPr>
-              <a:t>Methodology</a:t>
-            </a:r>
-          </a:p>
-          <a:p>
-            <a:pPr marL="685800" marR="0" lvl="1" indent="-228600" algn="l" defTabSz="914400" rtl="0" eaLnBrk="1" fontAlgn="auto" latinLnBrk="0" hangingPunct="1">
-              <a:lnSpc>
-                <a:spcPct val="90000"/>
-              </a:lnSpc>
-              <a:spcBef>
-                <a:spcPts val="500"/>
-              </a:spcBef>
-              <a:spcAft>
-                <a:spcPts val="0"/>
-              </a:spcAft>
-              <a:buClrTx/>
-              <a:buSzTx/>
-              <a:buFont typeface="Arial" panose="020B0604020202020204" pitchFamily="34" charset="0"/>
-              <a:buChar char="•"/>
-              <a:tabLst/>
-              <a:defRPr/>
-            </a:pPr>
-            <a:r>
-              <a:rPr lang="en-US" sz="3800" dirty="0">
-                <a:solidFill>
-                  <a:prstClr val="black"/>
-                </a:solidFill>
-                <a:latin typeface="Times New Roman" panose="02020603050405020304" pitchFamily="18" charset="0"/>
-                <a:cs typeface="Times New Roman" panose="02020603050405020304" pitchFamily="18" charset="0"/>
-              </a:rPr>
-              <a:t>Waterfall model</a:t>
-            </a:r>
-            <a:endParaRPr lang="en-US" sz="3800" dirty="0"/>
-          </a:p>
-        </p:txBody>
-      </p:sp>
-      <p:sp>
-        <p:nvSpPr>
-          <p:cNvPr id="5" name="Slide Number Placeholder 4">
-            <a:extLst>
-              <a:ext uri="{FF2B5EF4-FFF2-40B4-BE49-F238E27FC236}">
-                <a16:creationId xmlns:a16="http://schemas.microsoft.com/office/drawing/2014/main" id="{3D285344-DEA0-4B96-A253-8DB5BC90716D}"/>
-              </a:ext>
-            </a:extLst>
-          </p:cNvPr>
-          <p:cNvSpPr>
-            <a:spLocks noGrp="1"/>
-          </p:cNvSpPr>
-          <p:nvPr>
-            <p:ph type="sldNum" sz="quarter" idx="12"/>
-          </p:nvPr>
-        </p:nvSpPr>
-        <p:spPr/>
-        <p:txBody>
-          <a:bodyPr/>
-          <a:lstStyle/>
-          <a:p>
-            <a:fld id="{7A7E991E-64BF-47E2-9E90-5B64348DCA50}" type="slidenum">
-              <a:rPr lang="en-US" sz="2800" b="1" smtClean="0"/>
-              <a:t>7</a:t>
-            </a:fld>
-            <a:endParaRPr lang="en-US" sz="2800" b="1" dirty="0"/>
-          </a:p>
-        </p:txBody>
-      </p:sp>
-    </p:spTree>
-    <p:extLst>
-      <p:ext uri="{BB962C8B-B14F-4D97-AF65-F5344CB8AC3E}">
-        <p14:creationId xmlns:p14="http://schemas.microsoft.com/office/powerpoint/2010/main" val="559600348"/>
       </p:ext>
     </p:extLst>
   </p:cSld>
@@ -6331,6 +6362,134 @@
           <p:cNvPr id="2" name="Title 1">
             <a:extLst>
               <a:ext uri="{FF2B5EF4-FFF2-40B4-BE49-F238E27FC236}">
+                <a16:creationId xmlns:a16="http://schemas.microsoft.com/office/drawing/2014/main" id="{EA8595DA-2218-47F4-8FD9-179EFE5D788A}"/>
+              </a:ext>
+            </a:extLst>
+          </p:cNvPr>
+          <p:cNvSpPr>
+            <a:spLocks noGrp="1"/>
+          </p:cNvSpPr>
+          <p:nvPr>
+            <p:ph type="title"/>
+          </p:nvPr>
+        </p:nvSpPr>
+        <p:spPr/>
+        <p:txBody>
+          <a:bodyPr>
+            <a:normAutofit/>
+          </a:bodyPr>
+          <a:lstStyle/>
+          <a:p>
+            <a:r>
+              <a:rPr lang="en-US" sz="4800" b="1" dirty="0">
+                <a:latin typeface="Times New Roman" panose="02020603050405020304" pitchFamily="18" charset="0"/>
+                <a:ea typeface="Tahoma" panose="020B0604030504040204" pitchFamily="34" charset="0"/>
+                <a:cs typeface="Times New Roman" panose="02020603050405020304" pitchFamily="18" charset="0"/>
+              </a:rPr>
+              <a:t>Use case Diagram</a:t>
+            </a:r>
+          </a:p>
+        </p:txBody>
+      </p:sp>
+      <p:pic>
+        <p:nvPicPr>
+          <p:cNvPr id="6" name="Content Placeholder 5">
+            <a:extLst>
+              <a:ext uri="{FF2B5EF4-FFF2-40B4-BE49-F238E27FC236}">
+                <a16:creationId xmlns:a16="http://schemas.microsoft.com/office/drawing/2014/main" id="{AB0D6096-9435-45AB-A937-A180A4D999B3}"/>
+              </a:ext>
+            </a:extLst>
+          </p:cNvPr>
+          <p:cNvPicPr>
+            <a:picLocks noGrp="1" noChangeAspect="1"/>
+          </p:cNvPicPr>
+          <p:nvPr>
+            <p:ph idx="1"/>
+          </p:nvPr>
+        </p:nvPicPr>
+        <p:blipFill>
+          <a:blip r:embed="rId2">
+            <a:extLst>
+              <a:ext uri="{28A0092B-C50C-407E-A947-70E740481C1C}">
+                <a14:useLocalDpi xmlns:a14="http://schemas.microsoft.com/office/drawing/2010/main" val="0"/>
+              </a:ext>
+            </a:extLst>
+          </a:blip>
+          <a:stretch>
+            <a:fillRect/>
+          </a:stretch>
+        </p:blipFill>
+        <p:spPr>
+          <a:xfrm>
+            <a:off x="2279561" y="1924554"/>
+            <a:ext cx="7907628" cy="4431796"/>
+          </a:xfrm>
+        </p:spPr>
+      </p:pic>
+      <p:sp>
+        <p:nvSpPr>
+          <p:cNvPr id="4" name="Slide Number Placeholder 3">
+            <a:extLst>
+              <a:ext uri="{FF2B5EF4-FFF2-40B4-BE49-F238E27FC236}">
+                <a16:creationId xmlns:a16="http://schemas.microsoft.com/office/drawing/2014/main" id="{0A02C7B8-3F49-4B96-B3E4-5FA0122DF697}"/>
+              </a:ext>
+            </a:extLst>
+          </p:cNvPr>
+          <p:cNvSpPr>
+            <a:spLocks noGrp="1"/>
+          </p:cNvSpPr>
+          <p:nvPr>
+            <p:ph type="sldNum" sz="quarter" idx="12"/>
+          </p:nvPr>
+        </p:nvSpPr>
+        <p:spPr/>
+        <p:txBody>
+          <a:bodyPr/>
+          <a:lstStyle/>
+          <a:p>
+            <a:fld id="{7A7E991E-64BF-47E2-9E90-5B64348DCA50}" type="slidenum">
+              <a:rPr lang="en-US" smtClean="0"/>
+              <a:t>8</a:t>
+            </a:fld>
+            <a:endParaRPr lang="en-US"/>
+          </a:p>
+        </p:txBody>
+      </p:sp>
+    </p:spTree>
+    <p:extLst>
+      <p:ext uri="{BB962C8B-B14F-4D97-AF65-F5344CB8AC3E}">
+        <p14:creationId xmlns:p14="http://schemas.microsoft.com/office/powerpoint/2010/main" val="1452148071"/>
+      </p:ext>
+    </p:extLst>
+  </p:cSld>
+  <p:clrMapOvr>
+    <a:masterClrMapping/>
+  </p:clrMapOvr>
+</p:sld>
+</file>
+
+<file path=ppt/slides/slide9.xml><?xml version="1.0" encoding="utf-8"?>
+<p:sld xmlns:a="http://schemas.openxmlformats.org/drawingml/2006/main" xmlns:r="http://schemas.openxmlformats.org/officeDocument/2006/relationships" xmlns:p="http://schemas.openxmlformats.org/presentationml/2006/main">
+  <p:cSld>
+    <p:spTree>
+      <p:nvGrpSpPr>
+        <p:cNvPr id="1" name=""/>
+        <p:cNvGrpSpPr/>
+        <p:nvPr/>
+      </p:nvGrpSpPr>
+      <p:grpSpPr>
+        <a:xfrm>
+          <a:off x="0" y="0"/>
+          <a:ext cx="0" cy="0"/>
+          <a:chOff x="0" y="0"/>
+          <a:chExt cx="0" cy="0"/>
+        </a:xfrm>
+      </p:grpSpPr>
+      <p:sp>
+        <p:nvSpPr>
+          <p:cNvPr id="2" name="Title 1">
+            <a:extLst>
+              <a:ext uri="{FF2B5EF4-FFF2-40B4-BE49-F238E27FC236}">
                 <a16:creationId xmlns:a16="http://schemas.microsoft.com/office/drawing/2014/main" id="{03210B42-E751-4312-B1D7-A97D82BCEA9B}"/>
               </a:ext>
             </a:extLst>
@@ -6387,7 +6546,7 @@
           <a:p>
             <a:fld id="{7A7E991E-64BF-47E2-9E90-5B64348DCA50}" type="slidenum">
               <a:rPr lang="en-US" sz="2800" b="1" smtClean="0"/>
-              <a:t>8</a:t>
+              <a:t>9</a:t>
             </a:fld>
             <a:endParaRPr lang="en-US" sz="2800" b="1" dirty="0"/>
           </a:p>
@@ -6465,132 +6624,6 @@
     <p:extLst>
       <p:ext uri="{BB962C8B-B14F-4D97-AF65-F5344CB8AC3E}">
         <p14:creationId xmlns:p14="http://schemas.microsoft.com/office/powerpoint/2010/main" val="1121596734"/>
-      </p:ext>
-    </p:extLst>
-  </p:cSld>
-  <p:clrMapOvr>
-    <a:masterClrMapping/>
-  </p:clrMapOvr>
-</p:sld>
-</file>
-
-<file path=ppt/slides/slide9.xml><?xml version="1.0" encoding="utf-8"?>
-<p:sld xmlns:a="http://schemas.openxmlformats.org/drawingml/2006/main" xmlns:r="http://schemas.openxmlformats.org/officeDocument/2006/relationships" xmlns:p="http://schemas.openxmlformats.org/presentationml/2006/main">
-  <p:cSld>
-    <p:spTree>
-      <p:nvGrpSpPr>
-        <p:cNvPr id="1" name=""/>
-        <p:cNvGrpSpPr/>
-        <p:nvPr/>
-      </p:nvGrpSpPr>
-      <p:grpSpPr>
-        <a:xfrm>
-          <a:off x="0" y="0"/>
-          <a:ext cx="0" cy="0"/>
-          <a:chOff x="0" y="0"/>
-          <a:chExt cx="0" cy="0"/>
-        </a:xfrm>
-      </p:grpSpPr>
-      <p:sp>
-        <p:nvSpPr>
-          <p:cNvPr id="2" name="Title 1">
-            <a:extLst>
-              <a:ext uri="{FF2B5EF4-FFF2-40B4-BE49-F238E27FC236}">
-                <a16:creationId xmlns:a16="http://schemas.microsoft.com/office/drawing/2014/main" id="{CD9CBB1A-EC20-4450-8184-2B6847A6B43F}"/>
-              </a:ext>
-            </a:extLst>
-          </p:cNvPr>
-          <p:cNvSpPr>
-            <a:spLocks noGrp="1"/>
-          </p:cNvSpPr>
-          <p:nvPr>
-            <p:ph type="title"/>
-          </p:nvPr>
-        </p:nvSpPr>
-        <p:spPr/>
-        <p:txBody>
-          <a:bodyPr>
-            <a:normAutofit/>
-          </a:bodyPr>
-          <a:lstStyle/>
-          <a:p>
-            <a:r>
-              <a:rPr lang="en-US" sz="4800" b="1" dirty="0">
-                <a:latin typeface="Times New Roman" panose="02020603050405020304" pitchFamily="18" charset="0"/>
-                <a:cs typeface="Times New Roman" panose="02020603050405020304" pitchFamily="18" charset="0"/>
-              </a:rPr>
-              <a:t>Demo</a:t>
-            </a:r>
-          </a:p>
-        </p:txBody>
-      </p:sp>
-      <p:sp>
-        <p:nvSpPr>
-          <p:cNvPr id="3" name="Content Placeholder 2">
-            <a:extLst>
-              <a:ext uri="{FF2B5EF4-FFF2-40B4-BE49-F238E27FC236}">
-                <a16:creationId xmlns:a16="http://schemas.microsoft.com/office/drawing/2014/main" id="{CF4B280A-E4A9-465B-A519-2741D38882B4}"/>
-              </a:ext>
-            </a:extLst>
-          </p:cNvPr>
-          <p:cNvSpPr>
-            <a:spLocks noGrp="1"/>
-          </p:cNvSpPr>
-          <p:nvPr>
-            <p:ph idx="1"/>
-          </p:nvPr>
-        </p:nvSpPr>
-        <p:spPr/>
-        <p:txBody>
-          <a:bodyPr/>
-          <a:lstStyle/>
-          <a:p>
-            <a:pPr marL="0" indent="0">
-              <a:buNone/>
-            </a:pPr>
-            <a:r>
-              <a:rPr lang="en-US" dirty="0">
-                <a:hlinkClick r:id="rId2"/>
-              </a:rPr>
-              <a:t>http://localhost:9494/BikeSewa/</a:t>
-            </a:r>
-            <a:endParaRPr lang="en-US" dirty="0"/>
-          </a:p>
-        </p:txBody>
-      </p:sp>
-      <p:sp>
-        <p:nvSpPr>
-          <p:cNvPr id="4" name="Slide Number Placeholder 3">
-            <a:extLst>
-              <a:ext uri="{FF2B5EF4-FFF2-40B4-BE49-F238E27FC236}">
-                <a16:creationId xmlns:a16="http://schemas.microsoft.com/office/drawing/2014/main" id="{1DDA20B8-7283-44A6-85B5-5541DA769BD7}"/>
-              </a:ext>
-            </a:extLst>
-          </p:cNvPr>
-          <p:cNvSpPr>
-            <a:spLocks noGrp="1"/>
-          </p:cNvSpPr>
-          <p:nvPr>
-            <p:ph type="sldNum" sz="quarter" idx="12"/>
-          </p:nvPr>
-        </p:nvSpPr>
-        <p:spPr/>
-        <p:txBody>
-          <a:bodyPr/>
-          <a:lstStyle/>
-          <a:p>
-            <a:fld id="{7A7E991E-64BF-47E2-9E90-5B64348DCA50}" type="slidenum">
-              <a:rPr lang="en-US" smtClean="0"/>
-              <a:t>9</a:t>
-            </a:fld>
-            <a:endParaRPr lang="en-US"/>
-          </a:p>
-        </p:txBody>
-      </p:sp>
-    </p:spTree>
-    <p:extLst>
-      <p:ext uri="{BB962C8B-B14F-4D97-AF65-F5344CB8AC3E}">
-        <p14:creationId xmlns:p14="http://schemas.microsoft.com/office/powerpoint/2010/main" val="4212044755"/>
       </p:ext>
     </p:extLst>
   </p:cSld>

</xml_diff>